<commit_message>
Add demo slides for SPA template and win8 app client
</commit_message>
<xml_diff>
--- a/AddingWebApiToASPNETSite.pptx
+++ b/AddingWebApiToASPNETSite.pptx
@@ -6,10 +6,10 @@
     <p:sldMasterId id="2147483779" r:id="rId5"/>
   </p:sldMasterIdLst>
   <p:notesMasterIdLst>
-    <p:notesMasterId r:id="rId29"/>
+    <p:notesMasterId r:id="rId30"/>
   </p:notesMasterIdLst>
   <p:handoutMasterIdLst>
-    <p:handoutMasterId r:id="rId30"/>
+    <p:handoutMasterId r:id="rId31"/>
   </p:handoutMasterIdLst>
   <p:sldIdLst>
     <p:sldId id="296" r:id="rId6"/>
@@ -26,46 +26,47 @@
     <p:sldId id="268" r:id="rId17"/>
     <p:sldId id="300" r:id="rId18"/>
     <p:sldId id="302" r:id="rId19"/>
-    <p:sldId id="309" r:id="rId20"/>
-    <p:sldId id="269" r:id="rId21"/>
-    <p:sldId id="307" r:id="rId22"/>
-    <p:sldId id="308" r:id="rId23"/>
-    <p:sldId id="270" r:id="rId24"/>
-    <p:sldId id="314" r:id="rId25"/>
+    <p:sldId id="269" r:id="rId20"/>
+    <p:sldId id="307" r:id="rId21"/>
+    <p:sldId id="308" r:id="rId22"/>
+    <p:sldId id="309" r:id="rId23"/>
+    <p:sldId id="317" r:id="rId24"/>
+    <p:sldId id="318" r:id="rId25"/>
     <p:sldId id="291" r:id="rId26"/>
     <p:sldId id="292" r:id="rId27"/>
-    <p:sldId id="316" r:id="rId28"/>
+    <p:sldId id="314" r:id="rId28"/>
+    <p:sldId id="316" r:id="rId29"/>
   </p:sldIdLst>
   <p:sldSz cx="12188825" cy="6858000"/>
   <p:notesSz cx="6858000" cy="9296400"/>
   <p:embeddedFontLst>
     <p:embeddedFont>
-      <p:font typeface="Consolas" panose="020B0609020204030204" pitchFamily="49" charset="0"/>
-      <p:regular r:id="rId31"/>
-      <p:bold r:id="rId32"/>
-      <p:italic r:id="rId33"/>
-      <p:boldItalic r:id="rId34"/>
+      <p:font typeface="Consolas" pitchFamily="49" charset="0"/>
+      <p:regular r:id="rId32"/>
+      <p:bold r:id="rId33"/>
+      <p:italic r:id="rId34"/>
+      <p:boldItalic r:id="rId35"/>
     </p:embeddedFont>
     <p:embeddedFont>
-      <p:font typeface="Segoe Light" panose="020B0604020202020204" charset="0"/>
-      <p:regular r:id="rId35"/>
-      <p:italic r:id="rId36"/>
+      <p:font typeface="Segoe UI Light" pitchFamily="34" charset="0"/>
+      <p:regular r:id="rId36"/>
+      <p:italic r:id="rId37"/>
     </p:embeddedFont>
     <p:embeddedFont>
-      <p:font typeface="Segoe UI Light" panose="020B0502040204020203" pitchFamily="34" charset="0"/>
-      <p:regular r:id="rId37"/>
-      <p:italic r:id="rId38"/>
+      <p:font typeface="Segoe UI" pitchFamily="34" charset="0"/>
+      <p:regular r:id="rId38"/>
+      <p:bold r:id="rId39"/>
+      <p:italic r:id="rId40"/>
+      <p:boldItalic r:id="rId41"/>
     </p:embeddedFont>
     <p:embeddedFont>
-      <p:font typeface="Segoe UI" panose="020B0502040204020203" pitchFamily="34" charset="0"/>
-      <p:regular r:id="rId39"/>
-      <p:bold r:id="rId40"/>
-      <p:italic r:id="rId41"/>
-      <p:boldItalic r:id="rId42"/>
+      <p:font typeface="Segoe Light" charset="0"/>
+      <p:regular r:id="rId42"/>
+      <p:italic r:id="rId43"/>
     </p:embeddedFont>
   </p:embeddedFontLst>
   <p:custDataLst>
-    <p:tags r:id="rId43"/>
+    <p:tags r:id="rId44"/>
   </p:custDataLst>
   <p:defaultTextStyle>
     <a:defPPr>
@@ -164,7 +165,7 @@
   </p:defaultTextStyle>
   <p:extLst>
     <p:ext uri="{EFAFB233-063F-42B5-8137-9DF3F51BA10A}">
-      <p15:sldGuideLst xmlns:p15="http://schemas.microsoft.com/office/powerpoint/2012/main">
+      <p15:sldGuideLst xmlns:p15="http://schemas.microsoft.com/office/powerpoint/2012/main" xmlns="">
         <p15:guide id="1" orient="horz" pos="895">
           <p15:clr>
             <a:srgbClr val="A4A3A4"/>
@@ -203,7 +204,7 @@
       </p15:sldGuideLst>
     </p:ext>
     <p:ext uri="{2D200454-40CA-4A62-9FC3-DE9A4176ACB9}">
-      <p15:notesGuideLst xmlns:p15="http://schemas.microsoft.com/office/powerpoint/2012/main">
+      <p15:notesGuideLst xmlns:p15="http://schemas.microsoft.com/office/powerpoint/2012/main" xmlns="">
         <p15:guide id="1" orient="horz" pos="2928">
           <p15:clr>
             <a:srgbClr val="A4A3A4"/>
@@ -1635,15 +1636,15 @@
     <dgm:cxn modelId="{925B7A20-3B62-45BE-BB6E-AEFB15A3B7AA}" type="presOf" srcId="{947EF703-BCB5-429B-A365-C1D3BBCB8891}" destId="{565730E6-76D9-4992-B2E0-04BDA4E0175C}" srcOrd="0" destOrd="0" presId="urn:microsoft.com/office/officeart/2005/8/layout/hList1"/>
     <dgm:cxn modelId="{BD0F863C-C562-489F-8EA1-C51912A50309}" type="presOf" srcId="{1E308909-3458-4AFB-A2C7-D83858B4DFB6}" destId="{3BBE0E96-597D-436E-85B6-BD788570DDC6}" srcOrd="0" destOrd="1" presId="urn:microsoft.com/office/officeart/2005/8/layout/hList1"/>
     <dgm:cxn modelId="{FC6E8F75-8D41-4652-802A-E6EA649A0538}" srcId="{B0C4A85A-E702-4E8E-9447-5AC9E2688E93}" destId="{418E581D-4D33-4D1C-8617-3D39338A2D02}" srcOrd="1" destOrd="0" parTransId="{00FF94DD-E3B6-4DE2-B951-EC68F2BBDDBF}" sibTransId="{75882FDE-E0A6-40D5-8D7D-8A9958B97388}"/>
+    <dgm:cxn modelId="{E8F73402-67F4-426A-BF00-F0AD0E4C1C8A}" type="presOf" srcId="{A616F9A7-C32B-4CA8-94D0-1A02A9016BF7}" destId="{3BBE0E96-597D-436E-85B6-BD788570DDC6}" srcOrd="0" destOrd="4" presId="urn:microsoft.com/office/officeart/2005/8/layout/hList1"/>
     <dgm:cxn modelId="{FD9CAA52-82D7-493B-9D9C-0E901BFC91FD}" srcId="{36C18888-E6B3-4A3F-945F-46D62E3C85D0}" destId="{B0C4A85A-E702-4E8E-9447-5AC9E2688E93}" srcOrd="0" destOrd="0" parTransId="{4D41E08F-0657-44AC-983B-81671FD0F257}" sibTransId="{79323907-8858-4F49-B7B4-5B051247075B}"/>
-    <dgm:cxn modelId="{E8F73402-67F4-426A-BF00-F0AD0E4C1C8A}" type="presOf" srcId="{A616F9A7-C32B-4CA8-94D0-1A02A9016BF7}" destId="{3BBE0E96-597D-436E-85B6-BD788570DDC6}" srcOrd="0" destOrd="4" presId="urn:microsoft.com/office/officeart/2005/8/layout/hList1"/>
     <dgm:cxn modelId="{0C52D2A6-4236-4F76-8196-2B9DAA5A46A4}" srcId="{B0C4A85A-E702-4E8E-9447-5AC9E2688E93}" destId="{0E2295DA-C222-4357-9DE0-3A4D5D69BB46}" srcOrd="2" destOrd="0" parTransId="{129FAEC2-A513-4C65-92EB-5461CB2BD132}" sibTransId="{BD5E5961-1A95-44A0-AA01-5AB0EF2B9CFA}"/>
     <dgm:cxn modelId="{D9A06823-0BFF-49F2-899F-EE56455DEB7F}" type="presOf" srcId="{0E2295DA-C222-4357-9DE0-3A4D5D69BB46}" destId="{565730E6-76D9-4992-B2E0-04BDA4E0175C}" srcOrd="0" destOrd="2" presId="urn:microsoft.com/office/officeart/2005/8/layout/hList1"/>
     <dgm:cxn modelId="{AE08A043-CDE3-4289-9718-1F724EB0CD12}" srcId="{36C18888-E6B3-4A3F-945F-46D62E3C85D0}" destId="{91749CC0-3C52-4EF3-A6F1-13A55A766978}" srcOrd="1" destOrd="0" parTransId="{036D4F46-38B1-496E-9951-D70F7AA21544}" sibTransId="{FB9BA4AF-673A-4517-9444-4BCF97DB0F3F}"/>
     <dgm:cxn modelId="{DECCA291-2F79-4239-A721-F8171422C5EC}" srcId="{B0C4A85A-E702-4E8E-9447-5AC9E2688E93}" destId="{22428B5E-4E48-4035-AFCD-518E49C6A393}" srcOrd="3" destOrd="0" parTransId="{543E335F-4F36-4A80-A3E8-009DC0C04C78}" sibTransId="{363C7E6F-AD7A-466A-8DFF-172FD6232AF6}"/>
     <dgm:cxn modelId="{9BDB124F-8D93-4EF6-87C1-8B865D70A1E4}" srcId="{91749CC0-3C52-4EF3-A6F1-13A55A766978}" destId="{9F17B568-3C34-45ED-A463-5B7BAA9AC5B2}" srcOrd="0" destOrd="0" parTransId="{CD39A284-CFAC-4D13-97E6-D48FD951B35E}" sibTransId="{ED5F0BE5-F7B4-4A15-B1DB-FC304E290A33}"/>
+    <dgm:cxn modelId="{12BF631F-40D8-4FF3-A3C3-889E101D40AB}" type="presOf" srcId="{418E581D-4D33-4D1C-8617-3D39338A2D02}" destId="{565730E6-76D9-4992-B2E0-04BDA4E0175C}" srcOrd="0" destOrd="1" presId="urn:microsoft.com/office/officeart/2005/8/layout/hList1"/>
     <dgm:cxn modelId="{975AE904-35F1-4EE4-A7B8-736375C02897}" type="presOf" srcId="{E1662A7E-04FF-42B4-A97C-CC5B741006FA}" destId="{565730E6-76D9-4992-B2E0-04BDA4E0175C}" srcOrd="0" destOrd="5" presId="urn:microsoft.com/office/officeart/2005/8/layout/hList1"/>
-    <dgm:cxn modelId="{12BF631F-40D8-4FF3-A3C3-889E101D40AB}" type="presOf" srcId="{418E581D-4D33-4D1C-8617-3D39338A2D02}" destId="{565730E6-76D9-4992-B2E0-04BDA4E0175C}" srcOrd="0" destOrd="1" presId="urn:microsoft.com/office/officeart/2005/8/layout/hList1"/>
     <dgm:cxn modelId="{31C384CB-4D22-40FB-95CD-0FBEDB2DC7B3}" srcId="{91749CC0-3C52-4EF3-A6F1-13A55A766978}" destId="{591EE327-CDCB-49F3-8AE5-1109FD1BB2DB}" srcOrd="5" destOrd="0" parTransId="{2476335E-5328-4399-BFC2-3F573FB30030}" sibTransId="{761864A2-741A-4617-8D0D-C2E03C21BDC4}"/>
     <dgm:cxn modelId="{F32D62B4-F8FE-4608-AD7E-DA4E07857AED}" type="presOf" srcId="{D6EDBDD1-686E-41B7-B79B-13D35C4D7776}" destId="{565730E6-76D9-4992-B2E0-04BDA4E0175C}" srcOrd="0" destOrd="4" presId="urn:microsoft.com/office/officeart/2005/8/layout/hList1"/>
     <dgm:cxn modelId="{C358707F-B9E4-4E80-9324-C74C16E0C214}" srcId="{B0C4A85A-E702-4E8E-9447-5AC9E2688E93}" destId="{E1662A7E-04FF-42B4-A97C-CC5B741006FA}" srcOrd="5" destOrd="0" parTransId="{41D0A000-A944-47DA-9E8D-A7693EAC4EA5}" sibTransId="{8278A8A6-59EF-4F4C-A1B6-1120D1EC2E42}"/>
@@ -3564,7 +3565,7 @@
               <a:rPr lang="en-US" smtClean="0">
                 <a:latin typeface="Segoe UI" pitchFamily="34" charset="0"/>
               </a:rPr>
-              <a:t>11/29/2012</a:t>
+              <a:t>12/3/2012</a:t>
             </a:fld>
             <a:endParaRPr lang="en-US" dirty="0">
               <a:latin typeface="Segoe UI" pitchFamily="34" charset="0"/>
@@ -3746,7 +3747,7 @@
             <a:fld id="{CAE3F082-F902-42D8-A765-720E172C3194}" type="datetimeFigureOut">
               <a:rPr lang="en-US" smtClean="0"/>
               <a:pPr/>
-              <a:t>11/29/2012</a:t>
+              <a:t>12/3/2012</a:t>
             </a:fld>
             <a:endParaRPr lang="en-US" dirty="0"/>
           </a:p>
@@ -4390,7 +4391,7 @@
             <a:fld id="{82AABF77-E2E4-44CA-BA5C-65E132CF08D8}" type="slidenum">
               <a:rPr lang="en-US" smtClean="0"/>
               <a:pPr/>
-              <a:t>15</a:t>
+              <a:t>18</a:t>
             </a:fld>
             <a:endParaRPr lang="en-US" dirty="0"/>
           </a:p>
@@ -4400,6 +4401,257 @@
     <p:extLst>
       <p:ext uri="{BB962C8B-B14F-4D97-AF65-F5344CB8AC3E}">
         <p14:creationId xmlns:p14="http://schemas.microsoft.com/office/powerpoint/2010/main" val="428028699"/>
+      </p:ext>
+    </p:extLst>
+  </p:cSld>
+  <p:clrMapOvr>
+    <a:masterClrMapping/>
+  </p:clrMapOvr>
+</p:notes>
+</file>
+
+<file path=ppt/notesSlides/notesSlide3.xml><?xml version="1.0" encoding="utf-8"?>
+<p:notes xmlns:a="http://schemas.openxmlformats.org/drawingml/2006/main" xmlns:r="http://schemas.openxmlformats.org/officeDocument/2006/relationships" xmlns:p="http://schemas.openxmlformats.org/presentationml/2006/main">
+  <p:cSld>
+    <p:spTree>
+      <p:nvGrpSpPr>
+        <p:cNvPr id="1" name=""/>
+        <p:cNvGrpSpPr/>
+        <p:nvPr/>
+      </p:nvGrpSpPr>
+      <p:grpSpPr>
+        <a:xfrm>
+          <a:off x="0" y="0"/>
+          <a:ext cx="0" cy="0"/>
+          <a:chOff x="0" y="0"/>
+          <a:chExt cx="0" cy="0"/>
+        </a:xfrm>
+      </p:grpSpPr>
+      <p:sp>
+        <p:nvSpPr>
+          <p:cNvPr id="2" name="Slide Image Placeholder 1"/>
+          <p:cNvSpPr>
+            <a:spLocks noGrp="1" noRot="1" noChangeAspect="1"/>
+          </p:cNvSpPr>
+          <p:nvPr>
+            <p:ph type="sldImg"/>
+          </p:nvPr>
+        </p:nvSpPr>
+        <p:spPr/>
+      </p:sp>
+      <p:sp>
+        <p:nvSpPr>
+          <p:cNvPr id="3" name="Notes Placeholder 2"/>
+          <p:cNvSpPr>
+            <a:spLocks noGrp="1"/>
+          </p:cNvSpPr>
+          <p:nvPr>
+            <p:ph type="body" idx="1"/>
+          </p:nvPr>
+        </p:nvSpPr>
+        <p:spPr/>
+        <p:txBody>
+          <a:bodyPr/>
+          <a:lstStyle/>
+          <a:p>
+            <a:r>
+              <a:rPr lang="en-US" dirty="0" smtClean="0"/>
+              <a:t>Show how </a:t>
+            </a:r>
+            <a:r>
+              <a:rPr lang="en-US" dirty="0" err="1" smtClean="0"/>
+              <a:t>jQuery</a:t>
+            </a:r>
+            <a:r>
+              <a:rPr lang="en-US" dirty="0" smtClean="0"/>
+              <a:t> in SPA template talks to </a:t>
+            </a:r>
+            <a:r>
+              <a:rPr lang="en-US" dirty="0" err="1" smtClean="0"/>
+              <a:t>WebAPI</a:t>
+            </a:r>
+            <a:endParaRPr lang="en-CA" dirty="0"/>
+          </a:p>
+        </p:txBody>
+      </p:sp>
+      <p:sp>
+        <p:nvSpPr>
+          <p:cNvPr id="4" name="Slide Number Placeholder 3"/>
+          <p:cNvSpPr>
+            <a:spLocks noGrp="1"/>
+          </p:cNvSpPr>
+          <p:nvPr>
+            <p:ph type="sldNum" sz="quarter" idx="10"/>
+          </p:nvPr>
+        </p:nvSpPr>
+        <p:spPr/>
+        <p:txBody>
+          <a:bodyPr/>
+          <a:lstStyle/>
+          <a:p>
+            <a:fld id="{82AABF77-E2E4-44CA-BA5C-65E132CF08D8}" type="slidenum">
+              <a:rPr lang="en-US" smtClean="0"/>
+              <a:pPr/>
+              <a:t>19</a:t>
+            </a:fld>
+            <a:endParaRPr lang="en-US" dirty="0"/>
+          </a:p>
+        </p:txBody>
+      </p:sp>
+    </p:spTree>
+    <p:extLst>
+      <p:ext uri="{BB962C8B-B14F-4D97-AF65-F5344CB8AC3E}">
+        <p14:creationId xmlns:p14="http://schemas.microsoft.com/office/powerpoint/2010/main" val="3504813521"/>
+      </p:ext>
+    </p:extLst>
+  </p:cSld>
+  <p:clrMapOvr>
+    <a:masterClrMapping/>
+  </p:clrMapOvr>
+</p:notes>
+</file>
+
+<file path=ppt/notesSlides/notesSlide4.xml><?xml version="1.0" encoding="utf-8"?>
+<p:notes xmlns:a="http://schemas.openxmlformats.org/drawingml/2006/main" xmlns:r="http://schemas.openxmlformats.org/officeDocument/2006/relationships" xmlns:p="http://schemas.openxmlformats.org/presentationml/2006/main">
+  <p:cSld>
+    <p:spTree>
+      <p:nvGrpSpPr>
+        <p:cNvPr id="1" name=""/>
+        <p:cNvGrpSpPr/>
+        <p:nvPr/>
+      </p:nvGrpSpPr>
+      <p:grpSpPr>
+        <a:xfrm>
+          <a:off x="0" y="0"/>
+          <a:ext cx="0" cy="0"/>
+          <a:chOff x="0" y="0"/>
+          <a:chExt cx="0" cy="0"/>
+        </a:xfrm>
+      </p:grpSpPr>
+      <p:sp>
+        <p:nvSpPr>
+          <p:cNvPr id="2" name="Slide Image Placeholder 1"/>
+          <p:cNvSpPr>
+            <a:spLocks noGrp="1" noRot="1" noChangeAspect="1"/>
+          </p:cNvSpPr>
+          <p:nvPr>
+            <p:ph type="sldImg"/>
+          </p:nvPr>
+        </p:nvSpPr>
+        <p:spPr/>
+      </p:sp>
+      <p:sp>
+        <p:nvSpPr>
+          <p:cNvPr id="3" name="Notes Placeholder 2"/>
+          <p:cNvSpPr>
+            <a:spLocks noGrp="1"/>
+          </p:cNvSpPr>
+          <p:nvPr>
+            <p:ph type="body" idx="1"/>
+          </p:nvPr>
+        </p:nvSpPr>
+        <p:spPr/>
+        <p:txBody>
+          <a:bodyPr/>
+          <a:lstStyle/>
+          <a:p>
+            <a:r>
+              <a:rPr lang="en-US" dirty="0" smtClean="0"/>
+              <a:t>Show how Windows Store App talks to </a:t>
+            </a:r>
+            <a:r>
+              <a:rPr lang="en-US" dirty="0" err="1" smtClean="0"/>
+              <a:t>WebAPI</a:t>
+            </a:r>
+            <a:r>
+              <a:rPr lang="en-US" dirty="0" smtClean="0"/>
+              <a:t> </a:t>
+            </a:r>
+          </a:p>
+          <a:p>
+            <a:pPr marL="342900" indent="-342900">
+              <a:buFont typeface="+mj-lt"/>
+              <a:buAutoNum type="arabicPeriod"/>
+            </a:pPr>
+            <a:r>
+              <a:rPr lang="en-US" dirty="0" smtClean="0"/>
+              <a:t>Without change, Windows</a:t>
+            </a:r>
+            <a:r>
+              <a:rPr lang="en-US" baseline="0" dirty="0" smtClean="0"/>
+              <a:t> Store App can use form authentication</a:t>
+            </a:r>
+            <a:endParaRPr lang="en-US" dirty="0" smtClean="0"/>
+          </a:p>
+          <a:p>
+            <a:pPr marL="342900" indent="-342900">
+              <a:buFont typeface="+mj-lt"/>
+              <a:buAutoNum type="arabicPeriod"/>
+            </a:pPr>
+            <a:r>
+              <a:rPr lang="en-US" dirty="0" smtClean="0"/>
+              <a:t>With slight modification, </a:t>
+            </a:r>
+            <a:r>
+              <a:rPr lang="en-US" baseline="0" dirty="0" smtClean="0"/>
+              <a:t>windows store app can use </a:t>
+            </a:r>
+            <a:r>
+              <a:rPr lang="en-US" baseline="0" dirty="0" err="1" smtClean="0"/>
+              <a:t>webAPI</a:t>
+            </a:r>
+            <a:r>
+              <a:rPr lang="en-US" baseline="0" dirty="0" smtClean="0"/>
+              <a:t> with </a:t>
+            </a:r>
+            <a:r>
+              <a:rPr lang="en-US" baseline="0" dirty="0" err="1" smtClean="0"/>
+              <a:t>facebook</a:t>
+            </a:r>
+            <a:r>
+              <a:rPr lang="en-US" baseline="0" dirty="0" smtClean="0"/>
+              <a:t> authentication (not the best technique here, possibly use </a:t>
+            </a:r>
+            <a:r>
+              <a:rPr lang="en-US" baseline="0" dirty="0" err="1" smtClean="0"/>
+              <a:t>HttpClient</a:t>
+            </a:r>
+            <a:r>
+              <a:rPr lang="en-US" baseline="0" dirty="0" smtClean="0"/>
+              <a:t> to do it)</a:t>
+            </a:r>
+            <a:endParaRPr lang="en-CA" dirty="0"/>
+          </a:p>
+        </p:txBody>
+      </p:sp>
+      <p:sp>
+        <p:nvSpPr>
+          <p:cNvPr id="4" name="Slide Number Placeholder 3"/>
+          <p:cNvSpPr>
+            <a:spLocks noGrp="1"/>
+          </p:cNvSpPr>
+          <p:nvPr>
+            <p:ph type="sldNum" sz="quarter" idx="10"/>
+          </p:nvPr>
+        </p:nvSpPr>
+        <p:spPr/>
+        <p:txBody>
+          <a:bodyPr/>
+          <a:lstStyle/>
+          <a:p>
+            <a:fld id="{82AABF77-E2E4-44CA-BA5C-65E132CF08D8}" type="slidenum">
+              <a:rPr lang="en-US" smtClean="0"/>
+              <a:pPr/>
+              <a:t>20</a:t>
+            </a:fld>
+            <a:endParaRPr lang="en-US" dirty="0"/>
+          </a:p>
+        </p:txBody>
+      </p:sp>
+    </p:spTree>
+    <p:extLst>
+      <p:ext uri="{BB962C8B-B14F-4D97-AF65-F5344CB8AC3E}">
+        <p14:creationId xmlns:p14="http://schemas.microsoft.com/office/powerpoint/2010/main" val="904792282"/>
       </p:ext>
     </p:extLst>
   </p:cSld>
@@ -19669,7 +19921,7 @@
           <a:graphicData uri="http://schemas.openxmlformats.org/presentationml/2006/ole">
             <mc:AlternateContent xmlns:mc="http://schemas.openxmlformats.org/markup-compatibility/2006">
               <mc:Choice xmlns:v="urn:schemas-microsoft-com:vml" Requires="v">
-                <p:oleObj spid="_x0000_s34922" name="think-cell Slide" r:id="rId6" imgW="270" imgH="270" progId="TCLayout.ActiveDocument.1">
+                <p:oleObj spid="_x0000_s34924" name="think-cell Slide" r:id="rId6" imgW="270" imgH="270" progId="TCLayout.ActiveDocument.1">
                   <p:embed/>
                 </p:oleObj>
               </mc:Choice>
@@ -22237,188 +22489,6 @@
       </p:grpSpPr>
       <p:graphicFrame>
         <p:nvGraphicFramePr>
-          <p:cNvPr id="2" name="Object 1" hidden="1"/>
-          <p:cNvGraphicFramePr>
-            <a:graphicFrameLocks noChangeAspect="1"/>
-          </p:cNvGraphicFramePr>
-          <p:nvPr>
-            <p:custDataLst>
-              <p:tags r:id="rId2"/>
-            </p:custDataLst>
-            <p:extLst>
-              <p:ext uri="{D42A27DB-BD31-4B8C-83A1-F6EECF244321}">
-                <p14:modId xmlns:p14="http://schemas.microsoft.com/office/powerpoint/2010/main" val="385894085"/>
-              </p:ext>
-            </p:extLst>
-          </p:nvPr>
-        </p:nvGraphicFramePr>
-        <p:xfrm>
-          <a:off x="0" y="0"/>
-          <a:ext cx="158750" cy="158750"/>
-        </p:xfrm>
-        <a:graphic>
-          <a:graphicData uri="http://schemas.openxmlformats.org/presentationml/2006/ole">
-            <mc:AlternateContent xmlns:mc="http://schemas.openxmlformats.org/markup-compatibility/2006">
-              <mc:Choice xmlns:v="urn:schemas-microsoft-com:vml" Requires="v">
-                <p:oleObj spid="_x0000_s66581" name="think-cell Slide" r:id="rId6" imgW="270" imgH="270" progId="TCLayout.ActiveDocument.1">
-                  <p:embed/>
-                </p:oleObj>
-              </mc:Choice>
-              <mc:Fallback>
-                <p:oleObj name="think-cell Slide" r:id="rId6" imgW="270" imgH="270" progId="TCLayout.ActiveDocument.1">
-                  <p:embed/>
-                  <p:pic>
-                    <p:nvPicPr>
-                      <p:cNvPr id="0" name=""/>
-                      <p:cNvPicPr/>
-                      <p:nvPr/>
-                    </p:nvPicPr>
-                    <p:blipFill>
-                      <a:blip r:embed="rId7"/>
-                      <a:stretch>
-                        <a:fillRect/>
-                      </a:stretch>
-                    </p:blipFill>
-                    <p:spPr>
-                      <a:xfrm>
-                        <a:off x="0" y="0"/>
-                        <a:ext cx="158750" cy="158750"/>
-                      </a:xfrm>
-                      <a:prstGeom prst="rect">
-                        <a:avLst/>
-                      </a:prstGeom>
-                    </p:spPr>
-                  </p:pic>
-                </p:oleObj>
-              </mc:Fallback>
-            </mc:AlternateContent>
-          </a:graphicData>
-        </a:graphic>
-      </p:graphicFrame>
-      <p:sp>
-        <p:nvSpPr>
-          <p:cNvPr id="4" name="Title 3"/>
-          <p:cNvSpPr>
-            <a:spLocks noGrp="1"/>
-          </p:cNvSpPr>
-          <p:nvPr>
-            <p:ph type="ctrTitle"/>
-            <p:custDataLst>
-              <p:tags r:id="rId3"/>
-            </p:custDataLst>
-          </p:nvPr>
-        </p:nvSpPr>
-        <p:spPr>
-          <a:xfrm>
-            <a:off x="1889124" y="1447800"/>
-            <a:ext cx="4785995" cy="1523494"/>
-          </a:xfrm>
-        </p:spPr>
-        <p:txBody>
-          <a:bodyPr/>
-          <a:lstStyle/>
-          <a:p>
-            <a:r>
-              <a:rPr lang="en-US" dirty="0" smtClean="0"/>
-              <a:t>Introduction to ASP.NET Web API</a:t>
-            </a:r>
-            <a:endParaRPr lang="en-US" dirty="0"/>
-          </a:p>
-        </p:txBody>
-      </p:sp>
-      <p:sp>
-        <p:nvSpPr>
-          <p:cNvPr id="9" name="Subtitle 8"/>
-          <p:cNvSpPr>
-            <a:spLocks noGrp="1"/>
-          </p:cNvSpPr>
-          <p:nvPr>
-            <p:ph type="subTitle" idx="1"/>
-          </p:nvPr>
-        </p:nvSpPr>
-        <p:spPr/>
-        <p:txBody>
-          <a:bodyPr/>
-          <a:lstStyle/>
-          <a:p>
-            <a:endParaRPr lang="en-US"/>
-          </a:p>
-        </p:txBody>
-      </p:sp>
-      <p:sp>
-        <p:nvSpPr>
-          <p:cNvPr id="6" name="Text Placeholder 5"/>
-          <p:cNvSpPr>
-            <a:spLocks noGrp="1"/>
-          </p:cNvSpPr>
-          <p:nvPr>
-            <p:ph type="body" sz="quarter" idx="10"/>
-          </p:nvPr>
-        </p:nvSpPr>
-        <p:spPr/>
-        <p:txBody>
-          <a:bodyPr/>
-          <a:lstStyle/>
-          <a:p>
-            <a:r>
-              <a:rPr lang="en-US" smtClean="0"/>
-              <a:t>demo</a:t>
-            </a:r>
-            <a:endParaRPr lang="en-US" dirty="0"/>
-          </a:p>
-        </p:txBody>
-      </p:sp>
-    </p:spTree>
-    <p:extLst>
-      <p:ext uri="{BB962C8B-B14F-4D97-AF65-F5344CB8AC3E}">
-        <p14:creationId xmlns:p14="http://schemas.microsoft.com/office/powerpoint/2010/main" val="238013069"/>
-      </p:ext>
-    </p:extLst>
-  </p:cSld>
-  <p:clrMapOvr>
-    <a:masterClrMapping/>
-  </p:clrMapOvr>
-  <mc:AlternateContent xmlns:mc="http://schemas.openxmlformats.org/markup-compatibility/2006" xmlns:p14="http://schemas.microsoft.com/office/powerpoint/2010/main">
-    <mc:Choice Requires="p14">
-      <p:transition spd="med" p14:dur="700">
-        <p:fade/>
-      </p:transition>
-    </mc:Choice>
-    <mc:Fallback xmlns="">
-      <p:transition spd="med">
-        <p:fade/>
-      </p:transition>
-    </mc:Fallback>
-  </mc:AlternateContent>
-  <p:timing>
-    <p:tnLst>
-      <p:par>
-        <p:cTn id="1" dur="indefinite" restart="never" nodeType="tmRoot"/>
-      </p:par>
-    </p:tnLst>
-  </p:timing>
-</p:sld>
-</file>
-
-<file path=ppt/slides/slide16.xml><?xml version="1.0" encoding="utf-8"?>
-<p:sld xmlns:a="http://schemas.openxmlformats.org/drawingml/2006/main" xmlns:r="http://schemas.openxmlformats.org/officeDocument/2006/relationships" xmlns:p="http://schemas.openxmlformats.org/presentationml/2006/main">
-  <p:cSld>
-    <p:spTree>
-      <p:nvGrpSpPr>
-        <p:cNvPr id="1" name=""/>
-        <p:cNvGrpSpPr/>
-        <p:nvPr/>
-      </p:nvGrpSpPr>
-      <p:grpSpPr>
-        <a:xfrm>
-          <a:off x="0" y="0"/>
-          <a:ext cx="0" cy="0"/>
-          <a:chOff x="0" y="0"/>
-          <a:chExt cx="0" cy="0"/>
-        </a:xfrm>
-      </p:grpSpPr>
-      <p:graphicFrame>
-        <p:nvGraphicFramePr>
           <p:cNvPr id="3" name="Object 2" hidden="1"/>
           <p:cNvGraphicFramePr>
             <a:graphicFrameLocks noChangeAspect="1"/>
@@ -22442,7 +22512,7 @@
           <a:graphicData uri="http://schemas.openxmlformats.org/presentationml/2006/ole">
             <mc:AlternateContent xmlns:mc="http://schemas.openxmlformats.org/markup-compatibility/2006">
               <mc:Choice xmlns:v="urn:schemas-microsoft-com:vml" Requires="v">
-                <p:oleObj spid="_x0000_s35944" name="think-cell Slide" r:id="rId6" imgW="270" imgH="270" progId="TCLayout.ActiveDocument.1">
+                <p:oleObj spid="_x0000_s35946" name="think-cell Slide" r:id="rId6" imgW="270" imgH="270" progId="TCLayout.ActiveDocument.1">
                   <p:embed/>
                 </p:oleObj>
               </mc:Choice>
@@ -23907,7 +23977,7 @@
 </p:sld>
 </file>
 
-<file path=ppt/slides/slide17.xml><?xml version="1.0" encoding="utf-8"?>
+<file path=ppt/slides/slide16.xml><?xml version="1.0" encoding="utf-8"?>
 <p:sld xmlns:a="http://schemas.openxmlformats.org/drawingml/2006/main" xmlns:r="http://schemas.openxmlformats.org/officeDocument/2006/relationships" xmlns:p="http://schemas.openxmlformats.org/presentationml/2006/main">
   <p:cSld>
     <p:spTree>
@@ -24719,7 +24789,7 @@
 </p:sld>
 </file>
 
-<file path=ppt/slides/slide18.xml><?xml version="1.0" encoding="utf-8"?>
+<file path=ppt/slides/slide17.xml><?xml version="1.0" encoding="utf-8"?>
 <p:sld xmlns:a="http://schemas.openxmlformats.org/drawingml/2006/main" xmlns:r="http://schemas.openxmlformats.org/officeDocument/2006/relationships" xmlns:p="http://schemas.openxmlformats.org/presentationml/2006/main">
   <p:cSld>
     <p:spTree>
@@ -25451,7 +25521,7 @@
 </p:sld>
 </file>
 
-<file path=ppt/slides/slide19.xml><?xml version="1.0" encoding="utf-8"?>
+<file path=ppt/slides/slide18.xml><?xml version="1.0" encoding="utf-8"?>
 <p:sld xmlns:a="http://schemas.openxmlformats.org/drawingml/2006/main" xmlns:r="http://schemas.openxmlformats.org/officeDocument/2006/relationships" xmlns:p="http://schemas.openxmlformats.org/presentationml/2006/main">
   <p:cSld>
     <p:spTree>
@@ -25480,7 +25550,7 @@
             </p:custDataLst>
             <p:extLst>
               <p:ext uri="{D42A27DB-BD31-4B8C-83A1-F6EECF244321}">
-                <p14:modId xmlns:p14="http://schemas.microsoft.com/office/powerpoint/2010/main" val="862788351"/>
+                <p14:modId xmlns:p14="http://schemas.microsoft.com/office/powerpoint/2010/main" val="385894085"/>
               </p:ext>
             </p:extLst>
           </p:nvPr>
@@ -25493,12 +25563,12 @@
           <a:graphicData uri="http://schemas.openxmlformats.org/presentationml/2006/ole">
             <mc:AlternateContent xmlns:mc="http://schemas.openxmlformats.org/markup-compatibility/2006">
               <mc:Choice xmlns:v="urn:schemas-microsoft-com:vml" Requires="v">
-                <p:oleObj spid="_x0000_s36964" name="think-cell Slide" r:id="rId5" imgW="270" imgH="270" progId="TCLayout.ActiveDocument.1">
+                <p:oleObj spid="_x0000_s66583" name="think-cell Slide" r:id="rId6" imgW="270" imgH="270" progId="TCLayout.ActiveDocument.1">
                   <p:embed/>
                 </p:oleObj>
               </mc:Choice>
               <mc:Fallback>
-                <p:oleObj name="think-cell Slide" r:id="rId5" imgW="270" imgH="270" progId="TCLayout.ActiveDocument.1">
+                <p:oleObj name="think-cell Slide" r:id="rId6" imgW="270" imgH="270" progId="TCLayout.ActiveDocument.1">
                   <p:embed/>
                   <p:pic>
                     <p:nvPicPr>
@@ -25507,7 +25577,7 @@
                       <p:nvPr/>
                     </p:nvPicPr>
                     <p:blipFill>
-                      <a:blip r:embed="rId6"/>
+                      <a:blip r:embed="rId7"/>
                       <a:stretch>
                         <a:fillRect/>
                       </a:stretch>
@@ -25541,21 +25611,19 @@
             </p:custDataLst>
           </p:nvPr>
         </p:nvSpPr>
-        <p:spPr/>
+        <p:spPr>
+          <a:xfrm>
+            <a:off x="1889124" y="1447800"/>
+            <a:ext cx="4785995" cy="1523494"/>
+          </a:xfrm>
+        </p:spPr>
         <p:txBody>
           <a:bodyPr/>
           <a:lstStyle/>
           <a:p>
             <a:r>
-              <a:rPr lang="en-US" smtClean="0"/>
-              <a:t>Making an </a:t>
-            </a:r>
-            <a:br>
-              <a:rPr lang="en-US" smtClean="0"/>
-            </a:br>
-            <a:r>
-              <a:rPr lang="en-US" smtClean="0"/>
-              <a:t>API updatable</a:t>
+              <a:rPr lang="en-US" dirty="0" smtClean="0"/>
+              <a:t>Introduction to ASP.NET Web API</a:t>
             </a:r>
             <a:endParaRPr lang="en-US" dirty="0"/>
           </a:p>
@@ -25563,7 +25631,7 @@
       </p:sp>
       <p:sp>
         <p:nvSpPr>
-          <p:cNvPr id="3" name="Subtitle 2"/>
+          <p:cNvPr id="9" name="Subtitle 8"/>
           <p:cNvSpPr>
             <a:spLocks noGrp="1"/>
           </p:cNvSpPr>
@@ -25582,7 +25650,7 @@
       </p:sp>
       <p:sp>
         <p:nvSpPr>
-          <p:cNvPr id="5" name="Text Placeholder 4"/>
+          <p:cNvPr id="6" name="Text Placeholder 5"/>
           <p:cNvSpPr>
             <a:spLocks noGrp="1"/>
           </p:cNvSpPr>
@@ -25606,7 +25674,7 @@
     </p:spTree>
     <p:extLst>
       <p:ext uri="{BB962C8B-B14F-4D97-AF65-F5344CB8AC3E}">
-        <p14:creationId xmlns:p14="http://schemas.microsoft.com/office/powerpoint/2010/main" val="3681418292"/>
+        <p14:creationId xmlns:p14="http://schemas.microsoft.com/office/powerpoint/2010/main" val="238013069"/>
       </p:ext>
     </p:extLst>
   </p:cSld>
@@ -25632,6 +25700,113 @@
       </p:par>
     </p:tnLst>
   </p:timing>
+</p:sld>
+</file>
+
+<file path=ppt/slides/slide19.xml><?xml version="1.0" encoding="utf-8"?>
+<p:sld xmlns:a="http://schemas.openxmlformats.org/drawingml/2006/main" xmlns:r="http://schemas.openxmlformats.org/officeDocument/2006/relationships" xmlns:p="http://schemas.openxmlformats.org/presentationml/2006/main">
+  <p:cSld>
+    <p:spTree>
+      <p:nvGrpSpPr>
+        <p:cNvPr id="1" name=""/>
+        <p:cNvGrpSpPr/>
+        <p:nvPr/>
+      </p:nvGrpSpPr>
+      <p:grpSpPr>
+        <a:xfrm>
+          <a:off x="0" y="0"/>
+          <a:ext cx="0" cy="0"/>
+          <a:chOff x="0" y="0"/>
+          <a:chExt cx="0" cy="0"/>
+        </a:xfrm>
+      </p:grpSpPr>
+      <p:sp>
+        <p:nvSpPr>
+          <p:cNvPr id="6" name="Title 5"/>
+          <p:cNvSpPr>
+            <a:spLocks noGrp="1"/>
+          </p:cNvSpPr>
+          <p:nvPr>
+            <p:ph type="ctrTitle"/>
+          </p:nvPr>
+        </p:nvSpPr>
+        <p:spPr>
+          <a:xfrm>
+            <a:off x="1889124" y="1447800"/>
+            <a:ext cx="4511675" cy="1833282"/>
+          </a:xfrm>
+        </p:spPr>
+        <p:txBody>
+          <a:bodyPr/>
+          <a:lstStyle/>
+          <a:p>
+            <a:r>
+              <a:rPr lang="en-US" dirty="0" smtClean="0"/>
+              <a:t>MVC SPA template uses </a:t>
+            </a:r>
+            <a:r>
+              <a:rPr lang="en-US" dirty="0" err="1" smtClean="0"/>
+              <a:t>WebAPI</a:t>
+            </a:r>
+            <a:endParaRPr lang="en-CA" dirty="0"/>
+          </a:p>
+        </p:txBody>
+      </p:sp>
+      <p:sp>
+        <p:nvSpPr>
+          <p:cNvPr id="7" name="Subtitle 6"/>
+          <p:cNvSpPr>
+            <a:spLocks noGrp="1"/>
+          </p:cNvSpPr>
+          <p:nvPr>
+            <p:ph type="subTitle" idx="1"/>
+          </p:nvPr>
+        </p:nvSpPr>
+        <p:spPr/>
+        <p:txBody>
+          <a:bodyPr/>
+          <a:lstStyle/>
+          <a:p>
+            <a:endParaRPr lang="en-CA"/>
+          </a:p>
+        </p:txBody>
+      </p:sp>
+      <p:sp>
+        <p:nvSpPr>
+          <p:cNvPr id="8" name="Text Placeholder 7"/>
+          <p:cNvSpPr>
+            <a:spLocks noGrp="1"/>
+          </p:cNvSpPr>
+          <p:nvPr>
+            <p:ph type="body" sz="quarter" idx="10"/>
+          </p:nvPr>
+        </p:nvSpPr>
+        <p:spPr/>
+        <p:txBody>
+          <a:bodyPr/>
+          <a:lstStyle/>
+          <a:p>
+            <a:r>
+              <a:rPr lang="en-US" dirty="0" smtClean="0"/>
+              <a:t>Demo</a:t>
+            </a:r>
+            <a:endParaRPr lang="en-CA" dirty="0"/>
+          </a:p>
+        </p:txBody>
+      </p:sp>
+    </p:spTree>
+    <p:extLst>
+      <p:ext uri="{BB962C8B-B14F-4D97-AF65-F5344CB8AC3E}">
+        <p14:creationId xmlns:p14="http://schemas.microsoft.com/office/powerpoint/2010/main" val="2610886621"/>
+      </p:ext>
+    </p:extLst>
+  </p:cSld>
+  <p:clrMapOvr>
+    <a:masterClrMapping/>
+  </p:clrMapOvr>
+  <p:transition>
+    <p:fade/>
+  </p:transition>
 </p:sld>
 </file>
 
@@ -25677,7 +25852,7 @@
           <a:graphicData uri="http://schemas.openxmlformats.org/presentationml/2006/ole">
             <mc:AlternateContent xmlns:mc="http://schemas.openxmlformats.org/markup-compatibility/2006">
               <mc:Choice xmlns:v="urn:schemas-microsoft-com:vml" Requires="v">
-                <p:oleObj spid="_x0000_s59485" name="think-cell Slide" r:id="rId4" imgW="270" imgH="270" progId="TCLayout.ActiveDocument.1">
+                <p:oleObj spid="_x0000_s59487" name="think-cell Slide" r:id="rId4" imgW="270" imgH="270" progId="TCLayout.ActiveDocument.1">
                   <p:embed/>
                 </p:oleObj>
               </mc:Choice>
@@ -25816,6 +25991,699 @@
 
 <file path=ppt/slides/slide20.xml><?xml version="1.0" encoding="utf-8"?>
 <p:sld xmlns:a="http://schemas.openxmlformats.org/drawingml/2006/main" xmlns:r="http://schemas.openxmlformats.org/officeDocument/2006/relationships" xmlns:p="http://schemas.openxmlformats.org/presentationml/2006/main">
+  <p:cSld>
+    <p:spTree>
+      <p:nvGrpSpPr>
+        <p:cNvPr id="1" name=""/>
+        <p:cNvGrpSpPr/>
+        <p:nvPr/>
+      </p:nvGrpSpPr>
+      <p:grpSpPr>
+        <a:xfrm>
+          <a:off x="0" y="0"/>
+          <a:ext cx="0" cy="0"/>
+          <a:chOff x="0" y="0"/>
+          <a:chExt cx="0" cy="0"/>
+        </a:xfrm>
+      </p:grpSpPr>
+      <p:sp>
+        <p:nvSpPr>
+          <p:cNvPr id="5" name="Title 4"/>
+          <p:cNvSpPr>
+            <a:spLocks noGrp="1"/>
+          </p:cNvSpPr>
+          <p:nvPr>
+            <p:ph type="ctrTitle"/>
+          </p:nvPr>
+        </p:nvSpPr>
+        <p:spPr/>
+        <p:txBody>
+          <a:bodyPr/>
+          <a:lstStyle/>
+          <a:p>
+            <a:r>
+              <a:rPr lang="en-US" dirty="0" smtClean="0"/>
+              <a:t>Windows Store Apps Talk to </a:t>
+            </a:r>
+            <a:r>
+              <a:rPr lang="en-US" dirty="0" err="1" smtClean="0"/>
+              <a:t>WebAPI</a:t>
+            </a:r>
+            <a:endParaRPr lang="en-CA" dirty="0"/>
+          </a:p>
+        </p:txBody>
+      </p:sp>
+      <p:sp>
+        <p:nvSpPr>
+          <p:cNvPr id="6" name="Subtitle 5"/>
+          <p:cNvSpPr>
+            <a:spLocks noGrp="1"/>
+          </p:cNvSpPr>
+          <p:nvPr>
+            <p:ph type="subTitle" idx="1"/>
+          </p:nvPr>
+        </p:nvSpPr>
+        <p:spPr/>
+        <p:txBody>
+          <a:bodyPr/>
+          <a:lstStyle/>
+          <a:p>
+            <a:endParaRPr lang="en-CA"/>
+          </a:p>
+        </p:txBody>
+      </p:sp>
+      <p:sp>
+        <p:nvSpPr>
+          <p:cNvPr id="7" name="Text Placeholder 6"/>
+          <p:cNvSpPr>
+            <a:spLocks noGrp="1"/>
+          </p:cNvSpPr>
+          <p:nvPr>
+            <p:ph type="body" sz="quarter" idx="10"/>
+          </p:nvPr>
+        </p:nvSpPr>
+        <p:spPr/>
+        <p:txBody>
+          <a:bodyPr/>
+          <a:lstStyle/>
+          <a:p>
+            <a:r>
+              <a:rPr lang="en-US" dirty="0" smtClean="0"/>
+              <a:t>Demo</a:t>
+            </a:r>
+            <a:endParaRPr lang="en-CA" dirty="0"/>
+          </a:p>
+        </p:txBody>
+      </p:sp>
+    </p:spTree>
+    <p:extLst>
+      <p:ext uri="{BB962C8B-B14F-4D97-AF65-F5344CB8AC3E}">
+        <p14:creationId xmlns:p14="http://schemas.microsoft.com/office/powerpoint/2010/main" val="771203603"/>
+      </p:ext>
+    </p:extLst>
+  </p:cSld>
+  <p:clrMapOvr>
+    <a:masterClrMapping/>
+  </p:clrMapOvr>
+  <p:transition>
+    <p:fade/>
+  </p:transition>
+</p:sld>
+</file>
+
+<file path=ppt/slides/slide21.xml><?xml version="1.0" encoding="utf-8"?>
+<p:sld xmlns:a="http://schemas.openxmlformats.org/drawingml/2006/main" xmlns:r="http://schemas.openxmlformats.org/officeDocument/2006/relationships" xmlns:p="http://schemas.openxmlformats.org/presentationml/2006/main">
+  <p:cSld>
+    <p:spTree>
+      <p:nvGrpSpPr>
+        <p:cNvPr id="1" name=""/>
+        <p:cNvGrpSpPr/>
+        <p:nvPr/>
+      </p:nvGrpSpPr>
+      <p:grpSpPr>
+        <a:xfrm>
+          <a:off x="0" y="0"/>
+          <a:ext cx="0" cy="0"/>
+          <a:chOff x="0" y="0"/>
+          <a:chExt cx="0" cy="0"/>
+        </a:xfrm>
+      </p:grpSpPr>
+      <p:graphicFrame>
+        <p:nvGraphicFramePr>
+          <p:cNvPr id="2" name="Object 1" hidden="1"/>
+          <p:cNvGraphicFramePr>
+            <a:graphicFrameLocks noChangeAspect="1"/>
+          </p:cNvGraphicFramePr>
+          <p:nvPr>
+            <p:custDataLst>
+              <p:tags r:id="rId2"/>
+            </p:custDataLst>
+            <p:extLst>
+              <p:ext uri="{D42A27DB-BD31-4B8C-83A1-F6EECF244321}">
+                <p14:modId xmlns:p14="http://schemas.microsoft.com/office/powerpoint/2010/main" val="321265224"/>
+              </p:ext>
+            </p:extLst>
+          </p:nvPr>
+        </p:nvGraphicFramePr>
+        <p:xfrm>
+          <a:off x="0" y="0"/>
+          <a:ext cx="158750" cy="158750"/>
+        </p:xfrm>
+        <a:graphic>
+          <a:graphicData uri="http://schemas.openxmlformats.org/presentationml/2006/ole">
+            <mc:AlternateContent xmlns:mc="http://schemas.openxmlformats.org/markup-compatibility/2006">
+              <mc:Choice xmlns:v="urn:schemas-microsoft-com:vml" Requires="v">
+                <p:oleObj spid="_x0000_s57446" name="think-cell Slide" r:id="rId5" imgW="270" imgH="270" progId="TCLayout.ActiveDocument.1">
+                  <p:embed/>
+                </p:oleObj>
+              </mc:Choice>
+              <mc:Fallback>
+                <p:oleObj name="think-cell Slide" r:id="rId5" imgW="270" imgH="270" progId="TCLayout.ActiveDocument.1">
+                  <p:embed/>
+                  <p:pic>
+                    <p:nvPicPr>
+                      <p:cNvPr id="0" name=""/>
+                      <p:cNvPicPr/>
+                      <p:nvPr/>
+                    </p:nvPicPr>
+                    <p:blipFill>
+                      <a:blip r:embed="rId6"/>
+                      <a:stretch>
+                        <a:fillRect/>
+                      </a:stretch>
+                    </p:blipFill>
+                    <p:spPr>
+                      <a:xfrm>
+                        <a:off x="0" y="0"/>
+                        <a:ext cx="158750" cy="158750"/>
+                      </a:xfrm>
+                      <a:prstGeom prst="rect">
+                        <a:avLst/>
+                      </a:prstGeom>
+                    </p:spPr>
+                  </p:pic>
+                </p:oleObj>
+              </mc:Fallback>
+            </mc:AlternateContent>
+          </a:graphicData>
+        </a:graphic>
+      </p:graphicFrame>
+      <p:sp>
+        <p:nvSpPr>
+          <p:cNvPr id="5" name="Title 4"/>
+          <p:cNvSpPr>
+            <a:spLocks noGrp="1"/>
+          </p:cNvSpPr>
+          <p:nvPr>
+            <p:ph type="title"/>
+          </p:nvPr>
+        </p:nvSpPr>
+        <p:spPr/>
+        <p:txBody>
+          <a:bodyPr/>
+          <a:lstStyle/>
+          <a:p>
+            <a:r>
+              <a:rPr lang="en-US" smtClean="0"/>
+              <a:t>Resources</a:t>
+            </a:r>
+            <a:endParaRPr lang="en-US" dirty="0"/>
+          </a:p>
+        </p:txBody>
+      </p:sp>
+      <p:sp>
+        <p:nvSpPr>
+          <p:cNvPr id="3" name="Text Placeholder 2"/>
+          <p:cNvSpPr>
+            <a:spLocks noGrp="1"/>
+          </p:cNvSpPr>
+          <p:nvPr>
+            <p:ph type="body" sz="quarter" idx="10"/>
+            <p:custDataLst>
+              <p:tags r:id="rId3"/>
+            </p:custDataLst>
+          </p:nvPr>
+        </p:nvSpPr>
+        <p:spPr>
+          <a:xfrm>
+            <a:off x="519112" y="1141413"/>
+            <a:ext cx="11149013" cy="2480679"/>
+          </a:xfrm>
+        </p:spPr>
+        <p:txBody>
+          <a:bodyPr/>
+          <a:lstStyle/>
+          <a:p>
+            <a:pPr>
+              <a:spcAft>
+                <a:spcPts val="1200"/>
+              </a:spcAft>
+            </a:pPr>
+            <a:r>
+              <a:rPr lang="en-US" sz="4800" dirty="0">
+                <a:ln w="3175">
+                  <a:noFill/>
+                </a:ln>
+                <a:gradFill flip="none" rotWithShape="1">
+                  <a:gsLst>
+                    <a:gs pos="0">
+                      <a:srgbClr val="595959"/>
+                    </a:gs>
+                    <a:gs pos="86000">
+                      <a:srgbClr val="595959"/>
+                    </a:gs>
+                  </a:gsLst>
+                  <a:lin ang="5400000" scaled="0"/>
+                  <a:tileRect/>
+                </a:gradFill>
+                <a:cs typeface="Arial" charset="0"/>
+              </a:rPr>
+              <a:t>Feedback and questions </a:t>
+            </a:r>
+            <a:r>
+              <a:rPr lang="en-US" sz="4400" dirty="0" smtClean="0"/>
+              <a:t/>
+            </a:r>
+            <a:br>
+              <a:rPr lang="en-US" sz="4400" dirty="0" smtClean="0"/>
+            </a:br>
+            <a:r>
+              <a:rPr lang="en-US" sz="3600" dirty="0" smtClean="0">
+                <a:latin typeface="+mn-lt"/>
+                <a:hlinkClick r:id="rId7"/>
+              </a:rPr>
+              <a:t>http://forums.dev.windows.com</a:t>
+            </a:r>
+            <a:r>
+              <a:rPr lang="en-US" sz="3600" dirty="0" smtClean="0">
+                <a:latin typeface="+mn-lt"/>
+              </a:rPr>
+              <a:t> </a:t>
+            </a:r>
+            <a:endParaRPr lang="en-US" sz="4400" dirty="0"/>
+          </a:p>
+          <a:p>
+            <a:pPr>
+              <a:spcAft>
+                <a:spcPts val="1200"/>
+              </a:spcAft>
+            </a:pPr>
+            <a:r>
+              <a:rPr lang="en-US" sz="4800" dirty="0">
+                <a:ln w="3175">
+                  <a:noFill/>
+                </a:ln>
+                <a:gradFill flip="none" rotWithShape="1">
+                  <a:gsLst>
+                    <a:gs pos="0">
+                      <a:srgbClr val="595959"/>
+                    </a:gs>
+                    <a:gs pos="86000">
+                      <a:srgbClr val="595959"/>
+                    </a:gs>
+                  </a:gsLst>
+                  <a:lin ang="5400000" scaled="0"/>
+                  <a:tileRect/>
+                </a:gradFill>
+                <a:cs typeface="Arial" charset="0"/>
+              </a:rPr>
+              <a:t>Session feedback</a:t>
+            </a:r>
+            <a:r>
+              <a:rPr lang="en-US" sz="4400" dirty="0" smtClean="0"/>
+              <a:t/>
+            </a:r>
+            <a:br>
+              <a:rPr lang="en-US" sz="4400" dirty="0" smtClean="0"/>
+            </a:br>
+            <a:r>
+              <a:rPr lang="en-US" sz="3600" dirty="0" smtClean="0">
+                <a:latin typeface="+mn-lt"/>
+                <a:hlinkClick r:id="rId8"/>
+              </a:rPr>
+              <a:t>http://bldw.in/SessionFeedback</a:t>
+            </a:r>
+            <a:r>
+              <a:rPr lang="en-US" sz="3600" dirty="0" smtClean="0">
+                <a:latin typeface="+mn-lt"/>
+              </a:rPr>
+              <a:t> </a:t>
+            </a:r>
+            <a:endParaRPr lang="en-US" sz="3600" dirty="0">
+              <a:latin typeface="+mn-lt"/>
+            </a:endParaRPr>
+          </a:p>
+        </p:txBody>
+      </p:sp>
+      <p:sp>
+        <p:nvSpPr>
+          <p:cNvPr id="8" name="Freeform 58"/>
+          <p:cNvSpPr>
+            <a:spLocks noEditPoints="1"/>
+          </p:cNvSpPr>
+          <p:nvPr/>
+        </p:nvSpPr>
+        <p:spPr bwMode="black">
+          <a:xfrm>
+            <a:off x="7196409" y="1141413"/>
+            <a:ext cx="3689695" cy="3954680"/>
+          </a:xfrm>
+          <a:custGeom>
+            <a:avLst/>
+            <a:gdLst>
+              <a:gd name="T0" fmla="*/ 181 w 182"/>
+              <a:gd name="T1" fmla="*/ 65 h 195"/>
+              <a:gd name="T2" fmla="*/ 88 w 182"/>
+              <a:gd name="T3" fmla="*/ 0 h 195"/>
+              <a:gd name="T4" fmla="*/ 88 w 182"/>
+              <a:gd name="T5" fmla="*/ 40 h 195"/>
+              <a:gd name="T6" fmla="*/ 1 w 182"/>
+              <a:gd name="T7" fmla="*/ 40 h 195"/>
+              <a:gd name="T8" fmla="*/ 1 w 182"/>
+              <a:gd name="T9" fmla="*/ 89 h 195"/>
+              <a:gd name="T10" fmla="*/ 57 w 182"/>
+              <a:gd name="T11" fmla="*/ 89 h 195"/>
+              <a:gd name="T12" fmla="*/ 88 w 182"/>
+              <a:gd name="T13" fmla="*/ 68 h 195"/>
+              <a:gd name="T14" fmla="*/ 88 w 182"/>
+              <a:gd name="T15" fmla="*/ 130 h 195"/>
+              <a:gd name="T16" fmla="*/ 181 w 182"/>
+              <a:gd name="T17" fmla="*/ 65 h 195"/>
+              <a:gd name="T18" fmla="*/ 19 w 182"/>
+              <a:gd name="T19" fmla="*/ 127 h 195"/>
+              <a:gd name="T20" fmla="*/ 88 w 182"/>
+              <a:gd name="T21" fmla="*/ 172 h 195"/>
+              <a:gd name="T22" fmla="*/ 88 w 182"/>
+              <a:gd name="T23" fmla="*/ 142 h 195"/>
+              <a:gd name="T24" fmla="*/ 178 w 182"/>
+              <a:gd name="T25" fmla="*/ 142 h 195"/>
+              <a:gd name="T26" fmla="*/ 178 w 182"/>
+              <a:gd name="T27" fmla="*/ 153 h 195"/>
+              <a:gd name="T28" fmla="*/ 100 w 182"/>
+              <a:gd name="T29" fmla="*/ 153 h 195"/>
+              <a:gd name="T30" fmla="*/ 100 w 182"/>
+              <a:gd name="T31" fmla="*/ 195 h 195"/>
+              <a:gd name="T32" fmla="*/ 0 w 182"/>
+              <a:gd name="T33" fmla="*/ 127 h 195"/>
+              <a:gd name="T34" fmla="*/ 19 w 182"/>
+              <a:gd name="T35" fmla="*/ 127 h 195"/>
+            </a:gdLst>
+            <a:ahLst/>
+            <a:cxnLst>
+              <a:cxn ang="0">
+                <a:pos x="T0" y="T1"/>
+              </a:cxn>
+              <a:cxn ang="0">
+                <a:pos x="T2" y="T3"/>
+              </a:cxn>
+              <a:cxn ang="0">
+                <a:pos x="T4" y="T5"/>
+              </a:cxn>
+              <a:cxn ang="0">
+                <a:pos x="T6" y="T7"/>
+              </a:cxn>
+              <a:cxn ang="0">
+                <a:pos x="T8" y="T9"/>
+              </a:cxn>
+              <a:cxn ang="0">
+                <a:pos x="T10" y="T11"/>
+              </a:cxn>
+              <a:cxn ang="0">
+                <a:pos x="T12" y="T13"/>
+              </a:cxn>
+              <a:cxn ang="0">
+                <a:pos x="T14" y="T15"/>
+              </a:cxn>
+              <a:cxn ang="0">
+                <a:pos x="T16" y="T17"/>
+              </a:cxn>
+              <a:cxn ang="0">
+                <a:pos x="T18" y="T19"/>
+              </a:cxn>
+              <a:cxn ang="0">
+                <a:pos x="T20" y="T21"/>
+              </a:cxn>
+              <a:cxn ang="0">
+                <a:pos x="T22" y="T23"/>
+              </a:cxn>
+              <a:cxn ang="0">
+                <a:pos x="T24" y="T25"/>
+              </a:cxn>
+              <a:cxn ang="0">
+                <a:pos x="T26" y="T27"/>
+              </a:cxn>
+              <a:cxn ang="0">
+                <a:pos x="T28" y="T29"/>
+              </a:cxn>
+              <a:cxn ang="0">
+                <a:pos x="T30" y="T31"/>
+              </a:cxn>
+              <a:cxn ang="0">
+                <a:pos x="T32" y="T33"/>
+              </a:cxn>
+              <a:cxn ang="0">
+                <a:pos x="T34" y="T35"/>
+              </a:cxn>
+            </a:cxnLst>
+            <a:rect l="0" t="0" r="r" b="b"/>
+            <a:pathLst>
+              <a:path w="182" h="195">
+                <a:moveTo>
+                  <a:pt x="181" y="65"/>
+                </a:moveTo>
+                <a:cubicBezTo>
+                  <a:pt x="88" y="0"/>
+                  <a:pt x="88" y="0"/>
+                  <a:pt x="88" y="0"/>
+                </a:cubicBezTo>
+                <a:cubicBezTo>
+                  <a:pt x="88" y="40"/>
+                  <a:pt x="88" y="40"/>
+                  <a:pt x="88" y="40"/>
+                </a:cubicBezTo>
+                <a:cubicBezTo>
+                  <a:pt x="1" y="40"/>
+                  <a:pt x="1" y="40"/>
+                  <a:pt x="1" y="40"/>
+                </a:cubicBezTo>
+                <a:cubicBezTo>
+                  <a:pt x="1" y="89"/>
+                  <a:pt x="1" y="89"/>
+                  <a:pt x="1" y="89"/>
+                </a:cubicBezTo>
+                <a:cubicBezTo>
+                  <a:pt x="57" y="89"/>
+                  <a:pt x="57" y="89"/>
+                  <a:pt x="57" y="89"/>
+                </a:cubicBezTo>
+                <a:cubicBezTo>
+                  <a:pt x="88" y="68"/>
+                  <a:pt x="88" y="68"/>
+                  <a:pt x="88" y="68"/>
+                </a:cubicBezTo>
+                <a:cubicBezTo>
+                  <a:pt x="88" y="130"/>
+                  <a:pt x="88" y="130"/>
+                  <a:pt x="88" y="130"/>
+                </a:cubicBezTo>
+                <a:cubicBezTo>
+                  <a:pt x="181" y="65"/>
+                  <a:pt x="181" y="65"/>
+                  <a:pt x="181" y="65"/>
+                </a:cubicBezTo>
+                <a:close/>
+                <a:moveTo>
+                  <a:pt x="19" y="127"/>
+                </a:moveTo>
+                <a:cubicBezTo>
+                  <a:pt x="88" y="172"/>
+                  <a:pt x="88" y="172"/>
+                  <a:pt x="88" y="172"/>
+                </a:cubicBezTo>
+                <a:cubicBezTo>
+                  <a:pt x="88" y="142"/>
+                  <a:pt x="88" y="142"/>
+                  <a:pt x="88" y="142"/>
+                </a:cubicBezTo>
+                <a:cubicBezTo>
+                  <a:pt x="178" y="142"/>
+                  <a:pt x="178" y="142"/>
+                  <a:pt x="178" y="142"/>
+                </a:cubicBezTo>
+                <a:cubicBezTo>
+                  <a:pt x="182" y="142"/>
+                  <a:pt x="182" y="153"/>
+                  <a:pt x="178" y="153"/>
+                </a:cubicBezTo>
+                <a:cubicBezTo>
+                  <a:pt x="100" y="153"/>
+                  <a:pt x="100" y="153"/>
+                  <a:pt x="100" y="153"/>
+                </a:cubicBezTo>
+                <a:cubicBezTo>
+                  <a:pt x="100" y="195"/>
+                  <a:pt x="100" y="195"/>
+                  <a:pt x="100" y="195"/>
+                </a:cubicBezTo>
+                <a:cubicBezTo>
+                  <a:pt x="0" y="127"/>
+                  <a:pt x="0" y="127"/>
+                  <a:pt x="0" y="127"/>
+                </a:cubicBezTo>
+                <a:cubicBezTo>
+                  <a:pt x="19" y="127"/>
+                  <a:pt x="19" y="127"/>
+                  <a:pt x="19" y="127"/>
+                </a:cubicBezTo>
+                <a:close/>
+              </a:path>
+            </a:pathLst>
+          </a:custGeom>
+          <a:solidFill>
+            <a:schemeClr val="tx1">
+              <a:lumMod val="10000"/>
+              <a:lumOff val="90000"/>
+            </a:schemeClr>
+          </a:solidFill>
+          <a:ln>
+            <a:noFill/>
+          </a:ln>
+        </p:spPr>
+        <p:txBody>
+          <a:bodyPr vert="horz" wrap="square" lIns="82305" tIns="41153" rIns="82305" bIns="41153" numCol="1" anchor="t" anchorCtr="0" compatLnSpc="1">
+            <a:prstTxWarp prst="textNoShape">
+              <a:avLst/>
+            </a:prstTxWarp>
+          </a:bodyPr>
+          <a:lstStyle/>
+          <a:p>
+            <a:endParaRPr lang="en-US" sz="1600"/>
+          </a:p>
+        </p:txBody>
+      </p:sp>
+    </p:spTree>
+    <p:extLst>
+      <p:ext uri="{BB962C8B-B14F-4D97-AF65-F5344CB8AC3E}">
+        <p14:creationId xmlns:p14="http://schemas.microsoft.com/office/powerpoint/2010/main" val="2687524694"/>
+      </p:ext>
+    </p:extLst>
+  </p:cSld>
+  <p:clrMapOvr>
+    <a:masterClrMapping/>
+  </p:clrMapOvr>
+  <mc:AlternateContent xmlns:mc="http://schemas.openxmlformats.org/markup-compatibility/2006" xmlns:p14="http://schemas.microsoft.com/office/powerpoint/2010/main">
+    <mc:Choice Requires="p14">
+      <p:transition spd="med" p14:dur="700">
+        <p:fade/>
+      </p:transition>
+    </mc:Choice>
+    <mc:Fallback xmlns="">
+      <p:transition spd="med">
+        <p:fade/>
+      </p:transition>
+    </mc:Fallback>
+  </mc:AlternateContent>
+  <p:timing>
+    <p:tnLst>
+      <p:par>
+        <p:cTn id="1" dur="indefinite" restart="never" nodeType="tmRoot"/>
+      </p:par>
+    </p:tnLst>
+  </p:timing>
+</p:sld>
+</file>
+
+<file path=ppt/slides/slide22.xml><?xml version="1.0" encoding="utf-8"?>
+<p:sld xmlns:a="http://schemas.openxmlformats.org/drawingml/2006/main" xmlns:r="http://schemas.openxmlformats.org/officeDocument/2006/relationships" xmlns:p="http://schemas.openxmlformats.org/presentationml/2006/main">
+  <p:cSld>
+    <p:spTree>
+      <p:nvGrpSpPr>
+        <p:cNvPr id="1" name=""/>
+        <p:cNvGrpSpPr/>
+        <p:nvPr/>
+      </p:nvGrpSpPr>
+      <p:grpSpPr>
+        <a:xfrm>
+          <a:off x="0" y="0"/>
+          <a:ext cx="0" cy="0"/>
+          <a:chOff x="0" y="0"/>
+          <a:chExt cx="0" cy="0"/>
+        </a:xfrm>
+      </p:grpSpPr>
+      <p:graphicFrame>
+        <p:nvGraphicFramePr>
+          <p:cNvPr id="2" name="Object 1" hidden="1"/>
+          <p:cNvGraphicFramePr>
+            <a:graphicFrameLocks noChangeAspect="1"/>
+          </p:cNvGraphicFramePr>
+          <p:nvPr>
+            <p:custDataLst>
+              <p:tags r:id="rId2"/>
+            </p:custDataLst>
+            <p:extLst>
+              <p:ext uri="{D42A27DB-BD31-4B8C-83A1-F6EECF244321}">
+                <p14:modId xmlns:p14="http://schemas.microsoft.com/office/powerpoint/2010/main" val="3859461230"/>
+              </p:ext>
+            </p:extLst>
+          </p:nvPr>
+        </p:nvGraphicFramePr>
+        <p:xfrm>
+          <a:off x="0" y="0"/>
+          <a:ext cx="158750" cy="158750"/>
+        </p:xfrm>
+        <a:graphic>
+          <a:graphicData uri="http://schemas.openxmlformats.org/presentationml/2006/ole">
+            <mc:AlternateContent xmlns:mc="http://schemas.openxmlformats.org/markup-compatibility/2006">
+              <mc:Choice xmlns:v="urn:schemas-microsoft-com:vml" Requires="v">
+                <p:oleObj spid="_x0000_s58467" name="think-cell Slide" r:id="rId4" imgW="270" imgH="270" progId="TCLayout.ActiveDocument.1">
+                  <p:embed/>
+                </p:oleObj>
+              </mc:Choice>
+              <mc:Fallback>
+                <p:oleObj name="think-cell Slide" r:id="rId4" imgW="270" imgH="270" progId="TCLayout.ActiveDocument.1">
+                  <p:embed/>
+                  <p:pic>
+                    <p:nvPicPr>
+                      <p:cNvPr id="0" name=""/>
+                      <p:cNvPicPr/>
+                      <p:nvPr/>
+                    </p:nvPicPr>
+                    <p:blipFill>
+                      <a:blip r:embed="rId5"/>
+                      <a:stretch>
+                        <a:fillRect/>
+                      </a:stretch>
+                    </p:blipFill>
+                    <p:spPr>
+                      <a:xfrm>
+                        <a:off x="0" y="0"/>
+                        <a:ext cx="158750" cy="158750"/>
+                      </a:xfrm>
+                      <a:prstGeom prst="rect">
+                        <a:avLst/>
+                      </a:prstGeom>
+                    </p:spPr>
+                  </p:pic>
+                </p:oleObj>
+              </mc:Fallback>
+            </mc:AlternateContent>
+          </a:graphicData>
+        </a:graphic>
+      </p:graphicFrame>
+    </p:spTree>
+    <p:extLst>
+      <p:ext uri="{BB962C8B-B14F-4D97-AF65-F5344CB8AC3E}">
+        <p14:creationId xmlns:p14="http://schemas.microsoft.com/office/powerpoint/2010/main" val="1847082904"/>
+      </p:ext>
+    </p:extLst>
+  </p:cSld>
+  <p:clrMapOvr>
+    <a:masterClrMapping/>
+  </p:clrMapOvr>
+  <mc:AlternateContent xmlns:mc="http://schemas.openxmlformats.org/markup-compatibility/2006" xmlns:p14="http://schemas.microsoft.com/office/powerpoint/2010/main">
+    <mc:Choice Requires="p14">
+      <p:transition spd="med" p14:dur="700">
+        <p:fade/>
+      </p:transition>
+    </mc:Choice>
+    <mc:Fallback xmlns="">
+      <p:transition spd="med">
+        <p:fade/>
+      </p:transition>
+    </mc:Fallback>
+  </mc:AlternateContent>
+  <p:timing>
+    <p:tnLst>
+      <p:par>
+        <p:cTn id="1" dur="indefinite" restart="never" nodeType="tmRoot"/>
+      </p:par>
+    </p:tnLst>
+  </p:timing>
+</p:sld>
+</file>
+
+<file path=ppt/slides/slide23.xml><?xml version="1.0" encoding="utf-8"?>
+<p:sld xmlns:a="http://schemas.openxmlformats.org/drawingml/2006/main" xmlns:r="http://schemas.openxmlformats.org/officeDocument/2006/relationships" xmlns:p="http://schemas.openxmlformats.org/presentationml/2006/main" show="0">
   <p:cSld>
     <p:spTree>
       <p:nvGrpSpPr>
@@ -27609,598 +28477,7 @@
 </p:sld>
 </file>
 
-<file path=ppt/slides/slide21.xml><?xml version="1.0" encoding="utf-8"?>
-<p:sld xmlns:a="http://schemas.openxmlformats.org/drawingml/2006/main" xmlns:r="http://schemas.openxmlformats.org/officeDocument/2006/relationships" xmlns:p="http://schemas.openxmlformats.org/presentationml/2006/main">
-  <p:cSld>
-    <p:spTree>
-      <p:nvGrpSpPr>
-        <p:cNvPr id="1" name=""/>
-        <p:cNvGrpSpPr/>
-        <p:nvPr/>
-      </p:nvGrpSpPr>
-      <p:grpSpPr>
-        <a:xfrm>
-          <a:off x="0" y="0"/>
-          <a:ext cx="0" cy="0"/>
-          <a:chOff x="0" y="0"/>
-          <a:chExt cx="0" cy="0"/>
-        </a:xfrm>
-      </p:grpSpPr>
-      <p:graphicFrame>
-        <p:nvGraphicFramePr>
-          <p:cNvPr id="2" name="Object 1" hidden="1"/>
-          <p:cNvGraphicFramePr>
-            <a:graphicFrameLocks noChangeAspect="1"/>
-          </p:cNvGraphicFramePr>
-          <p:nvPr>
-            <p:custDataLst>
-              <p:tags r:id="rId2"/>
-            </p:custDataLst>
-            <p:extLst>
-              <p:ext uri="{D42A27DB-BD31-4B8C-83A1-F6EECF244321}">
-                <p14:modId xmlns:p14="http://schemas.microsoft.com/office/powerpoint/2010/main" val="321265224"/>
-              </p:ext>
-            </p:extLst>
-          </p:nvPr>
-        </p:nvGraphicFramePr>
-        <p:xfrm>
-          <a:off x="0" y="0"/>
-          <a:ext cx="158750" cy="158750"/>
-        </p:xfrm>
-        <a:graphic>
-          <a:graphicData uri="http://schemas.openxmlformats.org/presentationml/2006/ole">
-            <mc:AlternateContent xmlns:mc="http://schemas.openxmlformats.org/markup-compatibility/2006">
-              <mc:Choice xmlns:v="urn:schemas-microsoft-com:vml" Requires="v">
-                <p:oleObj spid="_x0000_s57444" name="think-cell Slide" r:id="rId5" imgW="270" imgH="270" progId="TCLayout.ActiveDocument.1">
-                  <p:embed/>
-                </p:oleObj>
-              </mc:Choice>
-              <mc:Fallback>
-                <p:oleObj name="think-cell Slide" r:id="rId5" imgW="270" imgH="270" progId="TCLayout.ActiveDocument.1">
-                  <p:embed/>
-                  <p:pic>
-                    <p:nvPicPr>
-                      <p:cNvPr id="0" name=""/>
-                      <p:cNvPicPr/>
-                      <p:nvPr/>
-                    </p:nvPicPr>
-                    <p:blipFill>
-                      <a:blip r:embed="rId6"/>
-                      <a:stretch>
-                        <a:fillRect/>
-                      </a:stretch>
-                    </p:blipFill>
-                    <p:spPr>
-                      <a:xfrm>
-                        <a:off x="0" y="0"/>
-                        <a:ext cx="158750" cy="158750"/>
-                      </a:xfrm>
-                      <a:prstGeom prst="rect">
-                        <a:avLst/>
-                      </a:prstGeom>
-                    </p:spPr>
-                  </p:pic>
-                </p:oleObj>
-              </mc:Fallback>
-            </mc:AlternateContent>
-          </a:graphicData>
-        </a:graphic>
-      </p:graphicFrame>
-      <p:sp>
-        <p:nvSpPr>
-          <p:cNvPr id="5" name="Title 4"/>
-          <p:cNvSpPr>
-            <a:spLocks noGrp="1"/>
-          </p:cNvSpPr>
-          <p:nvPr>
-            <p:ph type="title"/>
-          </p:nvPr>
-        </p:nvSpPr>
-        <p:spPr/>
-        <p:txBody>
-          <a:bodyPr/>
-          <a:lstStyle/>
-          <a:p>
-            <a:r>
-              <a:rPr lang="en-US" smtClean="0"/>
-              <a:t>Resources</a:t>
-            </a:r>
-            <a:endParaRPr lang="en-US" dirty="0"/>
-          </a:p>
-        </p:txBody>
-      </p:sp>
-      <p:sp>
-        <p:nvSpPr>
-          <p:cNvPr id="3" name="Text Placeholder 2"/>
-          <p:cNvSpPr>
-            <a:spLocks noGrp="1"/>
-          </p:cNvSpPr>
-          <p:nvPr>
-            <p:ph type="body" sz="quarter" idx="10"/>
-            <p:custDataLst>
-              <p:tags r:id="rId3"/>
-            </p:custDataLst>
-          </p:nvPr>
-        </p:nvSpPr>
-        <p:spPr>
-          <a:xfrm>
-            <a:off x="519112" y="1141413"/>
-            <a:ext cx="11149013" cy="2480679"/>
-          </a:xfrm>
-        </p:spPr>
-        <p:txBody>
-          <a:bodyPr/>
-          <a:lstStyle/>
-          <a:p>
-            <a:pPr>
-              <a:spcAft>
-                <a:spcPts val="1200"/>
-              </a:spcAft>
-            </a:pPr>
-            <a:r>
-              <a:rPr lang="en-US" sz="4800" dirty="0">
-                <a:ln w="3175">
-                  <a:noFill/>
-                </a:ln>
-                <a:gradFill flip="none" rotWithShape="1">
-                  <a:gsLst>
-                    <a:gs pos="0">
-                      <a:srgbClr val="595959"/>
-                    </a:gs>
-                    <a:gs pos="86000">
-                      <a:srgbClr val="595959"/>
-                    </a:gs>
-                  </a:gsLst>
-                  <a:lin ang="5400000" scaled="0"/>
-                  <a:tileRect/>
-                </a:gradFill>
-                <a:cs typeface="Arial" charset="0"/>
-              </a:rPr>
-              <a:t>Feedback and questions </a:t>
-            </a:r>
-            <a:r>
-              <a:rPr lang="en-US" sz="4400" dirty="0" smtClean="0"/>
-              <a:t/>
-            </a:r>
-            <a:br>
-              <a:rPr lang="en-US" sz="4400" dirty="0" smtClean="0"/>
-            </a:br>
-            <a:r>
-              <a:rPr lang="en-US" sz="3600" dirty="0" smtClean="0">
-                <a:latin typeface="+mn-lt"/>
-                <a:hlinkClick r:id="rId7"/>
-              </a:rPr>
-              <a:t>http://forums.dev.windows.com</a:t>
-            </a:r>
-            <a:r>
-              <a:rPr lang="en-US" sz="3600" dirty="0" smtClean="0">
-                <a:latin typeface="+mn-lt"/>
-              </a:rPr>
-              <a:t> </a:t>
-            </a:r>
-            <a:endParaRPr lang="en-US" sz="4400" dirty="0"/>
-          </a:p>
-          <a:p>
-            <a:pPr>
-              <a:spcAft>
-                <a:spcPts val="1200"/>
-              </a:spcAft>
-            </a:pPr>
-            <a:r>
-              <a:rPr lang="en-US" sz="4800" dirty="0">
-                <a:ln w="3175">
-                  <a:noFill/>
-                </a:ln>
-                <a:gradFill flip="none" rotWithShape="1">
-                  <a:gsLst>
-                    <a:gs pos="0">
-                      <a:srgbClr val="595959"/>
-                    </a:gs>
-                    <a:gs pos="86000">
-                      <a:srgbClr val="595959"/>
-                    </a:gs>
-                  </a:gsLst>
-                  <a:lin ang="5400000" scaled="0"/>
-                  <a:tileRect/>
-                </a:gradFill>
-                <a:cs typeface="Arial" charset="0"/>
-              </a:rPr>
-              <a:t>Session feedback</a:t>
-            </a:r>
-            <a:r>
-              <a:rPr lang="en-US" sz="4400" dirty="0" smtClean="0"/>
-              <a:t/>
-            </a:r>
-            <a:br>
-              <a:rPr lang="en-US" sz="4400" dirty="0" smtClean="0"/>
-            </a:br>
-            <a:r>
-              <a:rPr lang="en-US" sz="3600" dirty="0" smtClean="0">
-                <a:latin typeface="+mn-lt"/>
-                <a:hlinkClick r:id="rId8"/>
-              </a:rPr>
-              <a:t>http://bldw.in/SessionFeedback</a:t>
-            </a:r>
-            <a:r>
-              <a:rPr lang="en-US" sz="3600" dirty="0" smtClean="0">
-                <a:latin typeface="+mn-lt"/>
-              </a:rPr>
-              <a:t> </a:t>
-            </a:r>
-            <a:endParaRPr lang="en-US" sz="3600" dirty="0">
-              <a:latin typeface="+mn-lt"/>
-            </a:endParaRPr>
-          </a:p>
-        </p:txBody>
-      </p:sp>
-      <p:sp>
-        <p:nvSpPr>
-          <p:cNvPr id="8" name="Freeform 58"/>
-          <p:cNvSpPr>
-            <a:spLocks noEditPoints="1"/>
-          </p:cNvSpPr>
-          <p:nvPr/>
-        </p:nvSpPr>
-        <p:spPr bwMode="black">
-          <a:xfrm>
-            <a:off x="7196409" y="1141413"/>
-            <a:ext cx="3689695" cy="3954680"/>
-          </a:xfrm>
-          <a:custGeom>
-            <a:avLst/>
-            <a:gdLst>
-              <a:gd name="T0" fmla="*/ 181 w 182"/>
-              <a:gd name="T1" fmla="*/ 65 h 195"/>
-              <a:gd name="T2" fmla="*/ 88 w 182"/>
-              <a:gd name="T3" fmla="*/ 0 h 195"/>
-              <a:gd name="T4" fmla="*/ 88 w 182"/>
-              <a:gd name="T5" fmla="*/ 40 h 195"/>
-              <a:gd name="T6" fmla="*/ 1 w 182"/>
-              <a:gd name="T7" fmla="*/ 40 h 195"/>
-              <a:gd name="T8" fmla="*/ 1 w 182"/>
-              <a:gd name="T9" fmla="*/ 89 h 195"/>
-              <a:gd name="T10" fmla="*/ 57 w 182"/>
-              <a:gd name="T11" fmla="*/ 89 h 195"/>
-              <a:gd name="T12" fmla="*/ 88 w 182"/>
-              <a:gd name="T13" fmla="*/ 68 h 195"/>
-              <a:gd name="T14" fmla="*/ 88 w 182"/>
-              <a:gd name="T15" fmla="*/ 130 h 195"/>
-              <a:gd name="T16" fmla="*/ 181 w 182"/>
-              <a:gd name="T17" fmla="*/ 65 h 195"/>
-              <a:gd name="T18" fmla="*/ 19 w 182"/>
-              <a:gd name="T19" fmla="*/ 127 h 195"/>
-              <a:gd name="T20" fmla="*/ 88 w 182"/>
-              <a:gd name="T21" fmla="*/ 172 h 195"/>
-              <a:gd name="T22" fmla="*/ 88 w 182"/>
-              <a:gd name="T23" fmla="*/ 142 h 195"/>
-              <a:gd name="T24" fmla="*/ 178 w 182"/>
-              <a:gd name="T25" fmla="*/ 142 h 195"/>
-              <a:gd name="T26" fmla="*/ 178 w 182"/>
-              <a:gd name="T27" fmla="*/ 153 h 195"/>
-              <a:gd name="T28" fmla="*/ 100 w 182"/>
-              <a:gd name="T29" fmla="*/ 153 h 195"/>
-              <a:gd name="T30" fmla="*/ 100 w 182"/>
-              <a:gd name="T31" fmla="*/ 195 h 195"/>
-              <a:gd name="T32" fmla="*/ 0 w 182"/>
-              <a:gd name="T33" fmla="*/ 127 h 195"/>
-              <a:gd name="T34" fmla="*/ 19 w 182"/>
-              <a:gd name="T35" fmla="*/ 127 h 195"/>
-            </a:gdLst>
-            <a:ahLst/>
-            <a:cxnLst>
-              <a:cxn ang="0">
-                <a:pos x="T0" y="T1"/>
-              </a:cxn>
-              <a:cxn ang="0">
-                <a:pos x="T2" y="T3"/>
-              </a:cxn>
-              <a:cxn ang="0">
-                <a:pos x="T4" y="T5"/>
-              </a:cxn>
-              <a:cxn ang="0">
-                <a:pos x="T6" y="T7"/>
-              </a:cxn>
-              <a:cxn ang="0">
-                <a:pos x="T8" y="T9"/>
-              </a:cxn>
-              <a:cxn ang="0">
-                <a:pos x="T10" y="T11"/>
-              </a:cxn>
-              <a:cxn ang="0">
-                <a:pos x="T12" y="T13"/>
-              </a:cxn>
-              <a:cxn ang="0">
-                <a:pos x="T14" y="T15"/>
-              </a:cxn>
-              <a:cxn ang="0">
-                <a:pos x="T16" y="T17"/>
-              </a:cxn>
-              <a:cxn ang="0">
-                <a:pos x="T18" y="T19"/>
-              </a:cxn>
-              <a:cxn ang="0">
-                <a:pos x="T20" y="T21"/>
-              </a:cxn>
-              <a:cxn ang="0">
-                <a:pos x="T22" y="T23"/>
-              </a:cxn>
-              <a:cxn ang="0">
-                <a:pos x="T24" y="T25"/>
-              </a:cxn>
-              <a:cxn ang="0">
-                <a:pos x="T26" y="T27"/>
-              </a:cxn>
-              <a:cxn ang="0">
-                <a:pos x="T28" y="T29"/>
-              </a:cxn>
-              <a:cxn ang="0">
-                <a:pos x="T30" y="T31"/>
-              </a:cxn>
-              <a:cxn ang="0">
-                <a:pos x="T32" y="T33"/>
-              </a:cxn>
-              <a:cxn ang="0">
-                <a:pos x="T34" y="T35"/>
-              </a:cxn>
-            </a:cxnLst>
-            <a:rect l="0" t="0" r="r" b="b"/>
-            <a:pathLst>
-              <a:path w="182" h="195">
-                <a:moveTo>
-                  <a:pt x="181" y="65"/>
-                </a:moveTo>
-                <a:cubicBezTo>
-                  <a:pt x="88" y="0"/>
-                  <a:pt x="88" y="0"/>
-                  <a:pt x="88" y="0"/>
-                </a:cubicBezTo>
-                <a:cubicBezTo>
-                  <a:pt x="88" y="40"/>
-                  <a:pt x="88" y="40"/>
-                  <a:pt x="88" y="40"/>
-                </a:cubicBezTo>
-                <a:cubicBezTo>
-                  <a:pt x="1" y="40"/>
-                  <a:pt x="1" y="40"/>
-                  <a:pt x="1" y="40"/>
-                </a:cubicBezTo>
-                <a:cubicBezTo>
-                  <a:pt x="1" y="89"/>
-                  <a:pt x="1" y="89"/>
-                  <a:pt x="1" y="89"/>
-                </a:cubicBezTo>
-                <a:cubicBezTo>
-                  <a:pt x="57" y="89"/>
-                  <a:pt x="57" y="89"/>
-                  <a:pt x="57" y="89"/>
-                </a:cubicBezTo>
-                <a:cubicBezTo>
-                  <a:pt x="88" y="68"/>
-                  <a:pt x="88" y="68"/>
-                  <a:pt x="88" y="68"/>
-                </a:cubicBezTo>
-                <a:cubicBezTo>
-                  <a:pt x="88" y="130"/>
-                  <a:pt x="88" y="130"/>
-                  <a:pt x="88" y="130"/>
-                </a:cubicBezTo>
-                <a:cubicBezTo>
-                  <a:pt x="181" y="65"/>
-                  <a:pt x="181" y="65"/>
-                  <a:pt x="181" y="65"/>
-                </a:cubicBezTo>
-                <a:close/>
-                <a:moveTo>
-                  <a:pt x="19" y="127"/>
-                </a:moveTo>
-                <a:cubicBezTo>
-                  <a:pt x="88" y="172"/>
-                  <a:pt x="88" y="172"/>
-                  <a:pt x="88" y="172"/>
-                </a:cubicBezTo>
-                <a:cubicBezTo>
-                  <a:pt x="88" y="142"/>
-                  <a:pt x="88" y="142"/>
-                  <a:pt x="88" y="142"/>
-                </a:cubicBezTo>
-                <a:cubicBezTo>
-                  <a:pt x="178" y="142"/>
-                  <a:pt x="178" y="142"/>
-                  <a:pt x="178" y="142"/>
-                </a:cubicBezTo>
-                <a:cubicBezTo>
-                  <a:pt x="182" y="142"/>
-                  <a:pt x="182" y="153"/>
-                  <a:pt x="178" y="153"/>
-                </a:cubicBezTo>
-                <a:cubicBezTo>
-                  <a:pt x="100" y="153"/>
-                  <a:pt x="100" y="153"/>
-                  <a:pt x="100" y="153"/>
-                </a:cubicBezTo>
-                <a:cubicBezTo>
-                  <a:pt x="100" y="195"/>
-                  <a:pt x="100" y="195"/>
-                  <a:pt x="100" y="195"/>
-                </a:cubicBezTo>
-                <a:cubicBezTo>
-                  <a:pt x="0" y="127"/>
-                  <a:pt x="0" y="127"/>
-                  <a:pt x="0" y="127"/>
-                </a:cubicBezTo>
-                <a:cubicBezTo>
-                  <a:pt x="19" y="127"/>
-                  <a:pt x="19" y="127"/>
-                  <a:pt x="19" y="127"/>
-                </a:cubicBezTo>
-                <a:close/>
-              </a:path>
-            </a:pathLst>
-          </a:custGeom>
-          <a:solidFill>
-            <a:schemeClr val="tx1">
-              <a:lumMod val="10000"/>
-              <a:lumOff val="90000"/>
-            </a:schemeClr>
-          </a:solidFill>
-          <a:ln>
-            <a:noFill/>
-          </a:ln>
-        </p:spPr>
-        <p:txBody>
-          <a:bodyPr vert="horz" wrap="square" lIns="82305" tIns="41153" rIns="82305" bIns="41153" numCol="1" anchor="t" anchorCtr="0" compatLnSpc="1">
-            <a:prstTxWarp prst="textNoShape">
-              <a:avLst/>
-            </a:prstTxWarp>
-          </a:bodyPr>
-          <a:lstStyle/>
-          <a:p>
-            <a:endParaRPr lang="en-US" sz="1600"/>
-          </a:p>
-        </p:txBody>
-      </p:sp>
-    </p:spTree>
-    <p:extLst>
-      <p:ext uri="{BB962C8B-B14F-4D97-AF65-F5344CB8AC3E}">
-        <p14:creationId xmlns:p14="http://schemas.microsoft.com/office/powerpoint/2010/main" val="2687524694"/>
-      </p:ext>
-    </p:extLst>
-  </p:cSld>
-  <p:clrMapOvr>
-    <a:masterClrMapping/>
-  </p:clrMapOvr>
-  <mc:AlternateContent xmlns:mc="http://schemas.openxmlformats.org/markup-compatibility/2006" xmlns:p14="http://schemas.microsoft.com/office/powerpoint/2010/main">
-    <mc:Choice Requires="p14">
-      <p:transition spd="med" p14:dur="700">
-        <p:fade/>
-      </p:transition>
-    </mc:Choice>
-    <mc:Fallback xmlns="">
-      <p:transition spd="med">
-        <p:fade/>
-      </p:transition>
-    </mc:Fallback>
-  </mc:AlternateContent>
-  <p:timing>
-    <p:tnLst>
-      <p:par>
-        <p:cTn id="1" dur="indefinite" restart="never" nodeType="tmRoot"/>
-      </p:par>
-    </p:tnLst>
-  </p:timing>
-</p:sld>
-</file>
-
-<file path=ppt/slides/slide22.xml><?xml version="1.0" encoding="utf-8"?>
-<p:sld xmlns:a="http://schemas.openxmlformats.org/drawingml/2006/main" xmlns:r="http://schemas.openxmlformats.org/officeDocument/2006/relationships" xmlns:p="http://schemas.openxmlformats.org/presentationml/2006/main">
-  <p:cSld>
-    <p:spTree>
-      <p:nvGrpSpPr>
-        <p:cNvPr id="1" name=""/>
-        <p:cNvGrpSpPr/>
-        <p:nvPr/>
-      </p:nvGrpSpPr>
-      <p:grpSpPr>
-        <a:xfrm>
-          <a:off x="0" y="0"/>
-          <a:ext cx="0" cy="0"/>
-          <a:chOff x="0" y="0"/>
-          <a:chExt cx="0" cy="0"/>
-        </a:xfrm>
-      </p:grpSpPr>
-      <p:graphicFrame>
-        <p:nvGraphicFramePr>
-          <p:cNvPr id="2" name="Object 1" hidden="1"/>
-          <p:cNvGraphicFramePr>
-            <a:graphicFrameLocks noChangeAspect="1"/>
-          </p:cNvGraphicFramePr>
-          <p:nvPr>
-            <p:custDataLst>
-              <p:tags r:id="rId2"/>
-            </p:custDataLst>
-            <p:extLst>
-              <p:ext uri="{D42A27DB-BD31-4B8C-83A1-F6EECF244321}">
-                <p14:modId xmlns:p14="http://schemas.microsoft.com/office/powerpoint/2010/main" val="3859461230"/>
-              </p:ext>
-            </p:extLst>
-          </p:nvPr>
-        </p:nvGraphicFramePr>
-        <p:xfrm>
-          <a:off x="0" y="0"/>
-          <a:ext cx="158750" cy="158750"/>
-        </p:xfrm>
-        <a:graphic>
-          <a:graphicData uri="http://schemas.openxmlformats.org/presentationml/2006/ole">
-            <mc:AlternateContent xmlns:mc="http://schemas.openxmlformats.org/markup-compatibility/2006">
-              <mc:Choice xmlns:v="urn:schemas-microsoft-com:vml" Requires="v">
-                <p:oleObj spid="_x0000_s58465" name="think-cell Slide" r:id="rId4" imgW="270" imgH="270" progId="TCLayout.ActiveDocument.1">
-                  <p:embed/>
-                </p:oleObj>
-              </mc:Choice>
-              <mc:Fallback>
-                <p:oleObj name="think-cell Slide" r:id="rId4" imgW="270" imgH="270" progId="TCLayout.ActiveDocument.1">
-                  <p:embed/>
-                  <p:pic>
-                    <p:nvPicPr>
-                      <p:cNvPr id="0" name=""/>
-                      <p:cNvPicPr/>
-                      <p:nvPr/>
-                    </p:nvPicPr>
-                    <p:blipFill>
-                      <a:blip r:embed="rId5"/>
-                      <a:stretch>
-                        <a:fillRect/>
-                      </a:stretch>
-                    </p:blipFill>
-                    <p:spPr>
-                      <a:xfrm>
-                        <a:off x="0" y="0"/>
-                        <a:ext cx="158750" cy="158750"/>
-                      </a:xfrm>
-                      <a:prstGeom prst="rect">
-                        <a:avLst/>
-                      </a:prstGeom>
-                    </p:spPr>
-                  </p:pic>
-                </p:oleObj>
-              </mc:Fallback>
-            </mc:AlternateContent>
-          </a:graphicData>
-        </a:graphic>
-      </p:graphicFrame>
-    </p:spTree>
-    <p:extLst>
-      <p:ext uri="{BB962C8B-B14F-4D97-AF65-F5344CB8AC3E}">
-        <p14:creationId xmlns:p14="http://schemas.microsoft.com/office/powerpoint/2010/main" val="1847082904"/>
-      </p:ext>
-    </p:extLst>
-  </p:cSld>
-  <p:clrMapOvr>
-    <a:masterClrMapping/>
-  </p:clrMapOvr>
-  <mc:AlternateContent xmlns:mc="http://schemas.openxmlformats.org/markup-compatibility/2006" xmlns:p14="http://schemas.microsoft.com/office/powerpoint/2010/main">
-    <mc:Choice Requires="p14">
-      <p:transition spd="med" p14:dur="700">
-        <p:fade/>
-      </p:transition>
-    </mc:Choice>
-    <mc:Fallback xmlns="">
-      <p:transition spd="med">
-        <p:fade/>
-      </p:transition>
-    </mc:Fallback>
-  </mc:AlternateContent>
-  <p:timing>
-    <p:tnLst>
-      <p:par>
-        <p:cTn id="1" dur="indefinite" restart="never" nodeType="tmRoot"/>
-      </p:par>
-    </p:tnLst>
-  </p:timing>
-</p:sld>
-</file>
-
-<file path=ppt/slides/slide23.xml><?xml version="1.0" encoding="utf-8"?>
+<file path=ppt/slides/slide24.xml><?xml version="1.0" encoding="utf-8"?>
 <p:sld xmlns:a="http://schemas.openxmlformats.org/drawingml/2006/main" xmlns:r="http://schemas.openxmlformats.org/officeDocument/2006/relationships" xmlns:p="http://schemas.openxmlformats.org/presentationml/2006/main" show="0">
   <p:cSld>
     <p:spTree>
@@ -28316,7 +28593,7 @@
           <a:graphicData uri="http://schemas.openxmlformats.org/presentationml/2006/ole">
             <mc:AlternateContent xmlns:mc="http://schemas.openxmlformats.org/markup-compatibility/2006">
               <mc:Choice xmlns:v="urn:schemas-microsoft-com:vml" Requires="v">
-                <p:oleObj spid="_x0000_s23650" name="think-cell Slide" r:id="rId6" imgW="270" imgH="270" progId="TCLayout.ActiveDocument.1">
+                <p:oleObj spid="_x0000_s23652" name="think-cell Slide" r:id="rId6" imgW="270" imgH="270" progId="TCLayout.ActiveDocument.1">
                   <p:embed/>
                 </p:oleObj>
               </mc:Choice>
@@ -30221,7 +30498,7 @@
           <a:graphicData uri="http://schemas.openxmlformats.org/presentationml/2006/ole">
             <mc:AlternateContent xmlns:mc="http://schemas.openxmlformats.org/markup-compatibility/2006">
               <mc:Choice xmlns:v="urn:schemas-microsoft-com:vml" Requires="v">
-                <p:oleObj spid="_x0000_s61472" name="think-cell Slide" r:id="rId4" imgW="270" imgH="270" progId="TCLayout.ActiveDocument.1">
+                <p:oleObj spid="_x0000_s61474" name="think-cell Slide" r:id="rId4" imgW="270" imgH="270" progId="TCLayout.ActiveDocument.1">
                   <p:embed/>
                 </p:oleObj>
               </mc:Choice>
@@ -30691,7 +30968,7 @@
           <a:graphicData uri="http://schemas.openxmlformats.org/presentationml/2006/ole">
             <mc:AlternateContent xmlns:mc="http://schemas.openxmlformats.org/markup-compatibility/2006">
               <mc:Choice xmlns:v="urn:schemas-microsoft-com:vml" Requires="v">
-                <p:oleObj spid="_x0000_s62496" name="think-cell Slide" r:id="rId5" imgW="270" imgH="270" progId="TCLayout.ActiveDocument.1">
+                <p:oleObj spid="_x0000_s62498" name="think-cell Slide" r:id="rId5" imgW="270" imgH="270" progId="TCLayout.ActiveDocument.1">
                   <p:embed/>
                 </p:oleObj>
               </mc:Choice>
@@ -30892,7 +31169,7 @@
           <a:graphicData uri="http://schemas.openxmlformats.org/presentationml/2006/ole">
             <mc:AlternateContent xmlns:mc="http://schemas.openxmlformats.org/markup-compatibility/2006">
               <mc:Choice xmlns:v="urn:schemas-microsoft-com:vml" Requires="v">
-                <p:oleObj spid="_x0000_s63520" name="think-cell Slide" r:id="rId7" imgW="270" imgH="270" progId="TCLayout.ActiveDocument.1">
+                <p:oleObj spid="_x0000_s63522" name="think-cell Slide" r:id="rId7" imgW="270" imgH="270" progId="TCLayout.ActiveDocument.1">
                   <p:embed/>
                 </p:oleObj>
               </mc:Choice>
@@ -31411,7 +31688,7 @@
           <a:graphicData uri="http://schemas.openxmlformats.org/presentationml/2006/ole">
             <mc:AlternateContent xmlns:mc="http://schemas.openxmlformats.org/markup-compatibility/2006">
               <mc:Choice xmlns:v="urn:schemas-microsoft-com:vml" Requires="v">
-                <p:oleObj spid="_x0000_s29801" name="think-cell Slide" r:id="rId6" imgW="270" imgH="270" progId="TCLayout.ActiveDocument.1">
+                <p:oleObj spid="_x0000_s29803" name="think-cell Slide" r:id="rId6" imgW="270" imgH="270" progId="TCLayout.ActiveDocument.1">
                   <p:embed/>
                 </p:oleObj>
               </mc:Choice>
@@ -33494,25 +33771,25 @@
 
 <file path=ppt/tags/tag22.xml><?xml version="1.0" encoding="utf-8"?>
 <p:tagLst xmlns:a="http://schemas.openxmlformats.org/drawingml/2006/main" xmlns:r="http://schemas.openxmlformats.org/officeDocument/2006/relationships" xmlns:p="http://schemas.openxmlformats.org/presentationml/2006/main">
-  <p:tag name="THINKCELLSHAPEDONOTDELETE" val="pKrD95805lkyLQO9pM3_REQ"/>
+  <p:tag name="THINKCELLSHAPEDONOTDELETE" val="pnGWmLj.42EuGG.fPUDRgpA"/>
 </p:tagLst>
 </file>
 
 <file path=ppt/tags/tag23.xml><?xml version="1.0" encoding="utf-8"?>
 <p:tagLst xmlns:a="http://schemas.openxmlformats.org/drawingml/2006/main" xmlns:r="http://schemas.openxmlformats.org/officeDocument/2006/relationships" xmlns:p="http://schemas.openxmlformats.org/presentationml/2006/main">
-  <p:tag name="THINKCELLSHAPEDONOTDELETE" val="thinkcellActiveDocDoNotDelete"/>
+  <p:tag name="THINKCELLSHAPEDONOTDELETE" val="pmsziOZcAzkeLuUr01fOqhA"/>
 </p:tagLst>
 </file>
 
 <file path=ppt/tags/tag24.xml><?xml version="1.0" encoding="utf-8"?>
 <p:tagLst xmlns:a="http://schemas.openxmlformats.org/drawingml/2006/main" xmlns:r="http://schemas.openxmlformats.org/officeDocument/2006/relationships" xmlns:p="http://schemas.openxmlformats.org/presentationml/2006/main">
-  <p:tag name="THINKCELLSHAPEDONOTDELETE" val="pnGWmLj.42EuGG.fPUDRgpA"/>
+  <p:tag name="THINKCELLSHAPEDONOTDELETE" val="thinkcellActiveDocDoNotDelete"/>
 </p:tagLst>
 </file>
 
 <file path=ppt/tags/tag25.xml><?xml version="1.0" encoding="utf-8"?>
 <p:tagLst xmlns:a="http://schemas.openxmlformats.org/drawingml/2006/main" xmlns:r="http://schemas.openxmlformats.org/officeDocument/2006/relationships" xmlns:p="http://schemas.openxmlformats.org/presentationml/2006/main">
-  <p:tag name="THINKCELLSHAPEDONOTDELETE" val="pmsziOZcAzkeLuUr01fOqhA"/>
+  <p:tag name="THINKCELLSHAPEDONOTDELETE" val="pKrD95805lkyLQO9pM3_REQ"/>
 </p:tagLst>
 </file>
 
@@ -33524,7 +33801,7 @@
 
 <file path=ppt/tags/tag27.xml><?xml version="1.0" encoding="utf-8"?>
 <p:tagLst xmlns:a="http://schemas.openxmlformats.org/drawingml/2006/main" xmlns:r="http://schemas.openxmlformats.org/officeDocument/2006/relationships" xmlns:p="http://schemas.openxmlformats.org/presentationml/2006/main">
-  <p:tag name="THINKCELLSHAPEDONOTDELETE" val="pEIYRcEz4nE2YSTsJelfFPw"/>
+  <p:tag name="THINKCELLSHAPEDONOTDELETE" val="pXRmmtj9Uk0K6GWGBb7RAuA"/>
 </p:tagLst>
 </file>
 
@@ -33534,19 +33811,7 @@
 </p:tagLst>
 </file>
 
-<file path=ppt/tags/tag29.xml><?xml version="1.0" encoding="utf-8"?>
-<p:tagLst xmlns:a="http://schemas.openxmlformats.org/drawingml/2006/main" xmlns:r="http://schemas.openxmlformats.org/officeDocument/2006/relationships" xmlns:p="http://schemas.openxmlformats.org/presentationml/2006/main">
-  <p:tag name="THINKCELLSHAPEDONOTDELETE" val="pXRmmtj9Uk0K6GWGBb7RAuA"/>
-</p:tagLst>
-</file>
-
 <file path=ppt/tags/tag3.xml><?xml version="1.0" encoding="utf-8"?>
-<p:tagLst xmlns:a="http://schemas.openxmlformats.org/drawingml/2006/main" xmlns:r="http://schemas.openxmlformats.org/officeDocument/2006/relationships" xmlns:p="http://schemas.openxmlformats.org/presentationml/2006/main">
-  <p:tag name="THINKCELLSHAPEDONOTDELETE" val="thinkcellActiveDocDoNotDelete"/>
-</p:tagLst>
-</file>
-
-<file path=ppt/tags/tag30.xml><?xml version="1.0" encoding="utf-8"?>
 <p:tagLst xmlns:a="http://schemas.openxmlformats.org/drawingml/2006/main" xmlns:r="http://schemas.openxmlformats.org/officeDocument/2006/relationships" xmlns:p="http://schemas.openxmlformats.org/presentationml/2006/main">
   <p:tag name="THINKCELLSHAPEDONOTDELETE" val="thinkcellActiveDocDoNotDelete"/>
 </p:tagLst>
@@ -34794,15 +35059,6 @@
 </file>
 
 <file path=customXml/item1.xml><?xml version="1.0" encoding="utf-8"?>
-<?mso-contentType ?>
-<FormTemplates xmlns="http://schemas.microsoft.com/sharepoint/v3/contenttype/forms">
-  <Display>DocumentLibraryForm</Display>
-  <Edit>DocumentLibraryForm</Edit>
-  <New>DocumentLibraryForm</New>
-</FormTemplates>
-</file>
-
-<file path=customXml/item2.xml><?xml version="1.0" encoding="utf-8"?>
 <ct:contentTypeSchema xmlns:ct="http://schemas.microsoft.com/office/2006/metadata/contentType" xmlns:ma="http://schemas.microsoft.com/office/2006/metadata/properties/metaAttributes" ct:_="" ma:_="" ma:contentTypeName="Document" ma:contentTypeID="0x010100CA05B43BE68FE54B90DD26FDFB72BB05" ma:contentTypeVersion="0" ma:contentTypeDescription="Create a new document." ma:contentTypeScope="" ma:versionID="6df1bece345c1749bd9b91e82fa4a03a">
   <xsd:schema xmlns:xsd="http://www.w3.org/2001/XMLSchema" xmlns:xs="http://www.w3.org/2001/XMLSchema" xmlns:p="http://schemas.microsoft.com/office/2006/metadata/properties" xmlns:ns2="230e9df3-be65-4c73-a93b-d1236ebd677e" targetNamespace="http://schemas.microsoft.com/office/2006/metadata/properties" ma:root="true" ma:fieldsID="e317b0b832c9845d3aae3abd1bb0954e" ns2:_="">
     <xsd:import namespace="230e9df3-be65-4c73-a93b-d1236ebd677e"/>
@@ -34954,6 +35210,15 @@
 </ct:contentTypeSchema>
 </file>
 
+<file path=customXml/item2.xml><?xml version="1.0" encoding="utf-8"?>
+<?mso-contentType ?>
+<FormTemplates xmlns="http://schemas.microsoft.com/sharepoint/v3/contenttype/forms">
+  <Display>DocumentLibraryForm</Display>
+  <Edit>DocumentLibraryForm</Edit>
+  <New>DocumentLibraryForm</New>
+</FormTemplates>
+</file>
+
 <file path=customXml/item3.xml><?xml version="1.0" encoding="utf-8"?>
 <p:properties xmlns:p="http://schemas.microsoft.com/office/2006/metadata/properties" xmlns:xsi="http://www.w3.org/2001/XMLSchema-instance" xmlns:pc="http://schemas.microsoft.com/office/infopath/2007/PartnerControls">
   <documentManagement>
@@ -34966,14 +35231,6 @@
 </file>
 
 <file path=customXml/itemProps1.xml><?xml version="1.0" encoding="utf-8"?>
-<ds:datastoreItem xmlns:ds="http://schemas.openxmlformats.org/officeDocument/2006/customXml" ds:itemID="{B882D8D6-9D38-4159-A398-AAC3689D3D7C}">
-  <ds:schemaRefs>
-    <ds:schemaRef ds:uri="http://schemas.microsoft.com/sharepoint/v3/contenttype/forms"/>
-  </ds:schemaRefs>
-</ds:datastoreItem>
-</file>
-
-<file path=customXml/itemProps2.xml><?xml version="1.0" encoding="utf-8"?>
 <ds:datastoreItem xmlns:ds="http://schemas.openxmlformats.org/officeDocument/2006/customXml" ds:itemID="{8F590144-748D-417B-8B69-088F107B0F98}">
   <ds:schemaRefs>
     <ds:schemaRef ds:uri="http://schemas.microsoft.com/office/2006/metadata/contentType"/>
@@ -34987,6 +35244,14 @@
     <ds:schemaRef ds:uri="http://purl.org/dc/elements/1.1/"/>
     <ds:schemaRef ds:uri="http://purl.org/dc/terms/"/>
     <ds:schemaRef ds:uri="http://schemas.microsoft.com/internal/obd"/>
+  </ds:schemaRefs>
+</ds:datastoreItem>
+</file>
+
+<file path=customXml/itemProps2.xml><?xml version="1.0" encoding="utf-8"?>
+<ds:datastoreItem xmlns:ds="http://schemas.openxmlformats.org/officeDocument/2006/customXml" ds:itemID="{B882D8D6-9D38-4159-A398-AAC3689D3D7C}">
+  <ds:schemaRefs>
+    <ds:schemaRef ds:uri="http://schemas.microsoft.com/sharepoint/v3/contenttype/forms"/>
   </ds:schemaRefs>
 </ds:datastoreItem>
 </file>

</xml_diff>

<commit_message>
Added to content build
</commit_message>
<xml_diff>
--- a/AddingWebApiToASPNETSite.pptx
+++ b/AddingWebApiToASPNETSite.pptx
@@ -41,28 +41,28 @@
   <p:notesSz cx="6858000" cy="9296400"/>
   <p:embeddedFontLst>
     <p:embeddedFont>
-      <p:font typeface="Consolas" pitchFamily="49" charset="0"/>
+      <p:font typeface="Segoe UI Light" panose="020B0502040204020203" pitchFamily="34" charset="0"/>
       <p:regular r:id="rId32"/>
-      <p:bold r:id="rId33"/>
-      <p:italic r:id="rId34"/>
-      <p:boldItalic r:id="rId35"/>
+      <p:italic r:id="rId33"/>
     </p:embeddedFont>
     <p:embeddedFont>
-      <p:font typeface="Segoe UI Light" pitchFamily="34" charset="0"/>
-      <p:regular r:id="rId36"/>
-      <p:italic r:id="rId37"/>
+      <p:font typeface="Segoe UI" panose="020B0502040204020203" pitchFamily="34" charset="0"/>
+      <p:regular r:id="rId34"/>
+      <p:bold r:id="rId35"/>
+      <p:italic r:id="rId36"/>
+      <p:boldItalic r:id="rId37"/>
     </p:embeddedFont>
     <p:embeddedFont>
-      <p:font typeface="Segoe UI" pitchFamily="34" charset="0"/>
+      <p:font typeface="Segoe Light" panose="020B0604020202020204" charset="0"/>
       <p:regular r:id="rId38"/>
-      <p:bold r:id="rId39"/>
-      <p:italic r:id="rId40"/>
-      <p:boldItalic r:id="rId41"/>
+      <p:italic r:id="rId39"/>
     </p:embeddedFont>
     <p:embeddedFont>
-      <p:font typeface="Segoe Light" charset="0"/>
-      <p:regular r:id="rId42"/>
-      <p:italic r:id="rId43"/>
+      <p:font typeface="Consolas" panose="020B0609020204030204" pitchFamily="49" charset="0"/>
+      <p:regular r:id="rId40"/>
+      <p:bold r:id="rId41"/>
+      <p:italic r:id="rId42"/>
+      <p:boldItalic r:id="rId43"/>
     </p:embeddedFont>
   </p:embeddedFontLst>
   <p:custDataLst>
@@ -165,7 +165,7 @@
   </p:defaultTextStyle>
   <p:extLst>
     <p:ext uri="{EFAFB233-063F-42B5-8137-9DF3F51BA10A}">
-      <p15:sldGuideLst xmlns:p15="http://schemas.microsoft.com/office/powerpoint/2012/main" xmlns="">
+      <p15:sldGuideLst xmlns:p15="http://schemas.microsoft.com/office/powerpoint/2012/main">
         <p15:guide id="1" orient="horz" pos="895">
           <p15:clr>
             <a:srgbClr val="A4A3A4"/>
@@ -204,7 +204,7 @@
       </p15:sldGuideLst>
     </p:ext>
     <p:ext uri="{2D200454-40CA-4A62-9FC3-DE9A4176ACB9}">
-      <p15:notesGuideLst xmlns:p15="http://schemas.microsoft.com/office/powerpoint/2012/main" xmlns="">
+      <p15:notesGuideLst xmlns:p15="http://schemas.microsoft.com/office/powerpoint/2012/main">
         <p15:guide id="1" orient="horz" pos="2928">
           <p15:clr>
             <a:srgbClr val="A4A3A4"/>
@@ -1643,8 +1643,8 @@
     <dgm:cxn modelId="{AE08A043-CDE3-4289-9718-1F724EB0CD12}" srcId="{36C18888-E6B3-4A3F-945F-46D62E3C85D0}" destId="{91749CC0-3C52-4EF3-A6F1-13A55A766978}" srcOrd="1" destOrd="0" parTransId="{036D4F46-38B1-496E-9951-D70F7AA21544}" sibTransId="{FB9BA4AF-673A-4517-9444-4BCF97DB0F3F}"/>
     <dgm:cxn modelId="{DECCA291-2F79-4239-A721-F8171422C5EC}" srcId="{B0C4A85A-E702-4E8E-9447-5AC9E2688E93}" destId="{22428B5E-4E48-4035-AFCD-518E49C6A393}" srcOrd="3" destOrd="0" parTransId="{543E335F-4F36-4A80-A3E8-009DC0C04C78}" sibTransId="{363C7E6F-AD7A-466A-8DFF-172FD6232AF6}"/>
     <dgm:cxn modelId="{9BDB124F-8D93-4EF6-87C1-8B865D70A1E4}" srcId="{91749CC0-3C52-4EF3-A6F1-13A55A766978}" destId="{9F17B568-3C34-45ED-A463-5B7BAA9AC5B2}" srcOrd="0" destOrd="0" parTransId="{CD39A284-CFAC-4D13-97E6-D48FD951B35E}" sibTransId="{ED5F0BE5-F7B4-4A15-B1DB-FC304E290A33}"/>
+    <dgm:cxn modelId="{975AE904-35F1-4EE4-A7B8-736375C02897}" type="presOf" srcId="{E1662A7E-04FF-42B4-A97C-CC5B741006FA}" destId="{565730E6-76D9-4992-B2E0-04BDA4E0175C}" srcOrd="0" destOrd="5" presId="urn:microsoft.com/office/officeart/2005/8/layout/hList1"/>
     <dgm:cxn modelId="{12BF631F-40D8-4FF3-A3C3-889E101D40AB}" type="presOf" srcId="{418E581D-4D33-4D1C-8617-3D39338A2D02}" destId="{565730E6-76D9-4992-B2E0-04BDA4E0175C}" srcOrd="0" destOrd="1" presId="urn:microsoft.com/office/officeart/2005/8/layout/hList1"/>
-    <dgm:cxn modelId="{975AE904-35F1-4EE4-A7B8-736375C02897}" type="presOf" srcId="{E1662A7E-04FF-42B4-A97C-CC5B741006FA}" destId="{565730E6-76D9-4992-B2E0-04BDA4E0175C}" srcOrd="0" destOrd="5" presId="urn:microsoft.com/office/officeart/2005/8/layout/hList1"/>
     <dgm:cxn modelId="{31C384CB-4D22-40FB-95CD-0FBEDB2DC7B3}" srcId="{91749CC0-3C52-4EF3-A6F1-13A55A766978}" destId="{591EE327-CDCB-49F3-8AE5-1109FD1BB2DB}" srcOrd="5" destOrd="0" parTransId="{2476335E-5328-4399-BFC2-3F573FB30030}" sibTransId="{761864A2-741A-4617-8D0D-C2E03C21BDC4}"/>
     <dgm:cxn modelId="{F32D62B4-F8FE-4608-AD7E-DA4E07857AED}" type="presOf" srcId="{D6EDBDD1-686E-41B7-B79B-13D35C4D7776}" destId="{565730E6-76D9-4992-B2E0-04BDA4E0175C}" srcOrd="0" destOrd="4" presId="urn:microsoft.com/office/officeart/2005/8/layout/hList1"/>
     <dgm:cxn modelId="{C358707F-B9E4-4E80-9324-C74C16E0C214}" srcId="{B0C4A85A-E702-4E8E-9447-5AC9E2688E93}" destId="{E1662A7E-04FF-42B4-A97C-CC5B741006FA}" srcOrd="5" destOrd="0" parTransId="{41D0A000-A944-47DA-9E8D-A7693EAC4EA5}" sibTransId="{8278A8A6-59EF-4F4C-A1B6-1120D1EC2E42}"/>
@@ -3565,7 +3565,7 @@
               <a:rPr lang="en-US" smtClean="0">
                 <a:latin typeface="Segoe UI" pitchFamily="34" charset="0"/>
               </a:rPr>
-              <a:t>12/3/2012</a:t>
+              <a:t>12/7/2012</a:t>
             </a:fld>
             <a:endParaRPr lang="en-US" dirty="0">
               <a:latin typeface="Segoe UI" pitchFamily="34" charset="0"/>
@@ -3747,7 +3747,7 @@
             <a:fld id="{CAE3F082-F902-42D8-A765-720E172C3194}" type="datetimeFigureOut">
               <a:rPr lang="en-US" smtClean="0"/>
               <a:pPr/>
-              <a:t>12/3/2012</a:t>
+              <a:t>12/7/2012</a:t>
             </a:fld>
             <a:endParaRPr lang="en-US" dirty="0"/>
           </a:p>
@@ -19921,7 +19921,7 @@
           <a:graphicData uri="http://schemas.openxmlformats.org/presentationml/2006/ole">
             <mc:AlternateContent xmlns:mc="http://schemas.openxmlformats.org/markup-compatibility/2006">
               <mc:Choice xmlns:v="urn:schemas-microsoft-com:vml" Requires="v">
-                <p:oleObj spid="_x0000_s34924" name="think-cell Slide" r:id="rId6" imgW="270" imgH="270" progId="TCLayout.ActiveDocument.1">
+                <p:oleObj spid="_x0000_s34926" name="think-cell Slide" r:id="rId6" imgW="270" imgH="270" progId="TCLayout.ActiveDocument.1">
                   <p:embed/>
                 </p:oleObj>
               </mc:Choice>
@@ -22512,7 +22512,7 @@
           <a:graphicData uri="http://schemas.openxmlformats.org/presentationml/2006/ole">
             <mc:AlternateContent xmlns:mc="http://schemas.openxmlformats.org/markup-compatibility/2006">
               <mc:Choice xmlns:v="urn:schemas-microsoft-com:vml" Requires="v">
-                <p:oleObj spid="_x0000_s35946" name="think-cell Slide" r:id="rId6" imgW="270" imgH="270" progId="TCLayout.ActiveDocument.1">
+                <p:oleObj spid="_x0000_s35948" name="think-cell Slide" r:id="rId6" imgW="270" imgH="270" progId="TCLayout.ActiveDocument.1">
                   <p:embed/>
                 </p:oleObj>
               </mc:Choice>
@@ -25563,7 +25563,7 @@
           <a:graphicData uri="http://schemas.openxmlformats.org/presentationml/2006/ole">
             <mc:AlternateContent xmlns:mc="http://schemas.openxmlformats.org/markup-compatibility/2006">
               <mc:Choice xmlns:v="urn:schemas-microsoft-com:vml" Requires="v">
-                <p:oleObj spid="_x0000_s66583" name="think-cell Slide" r:id="rId6" imgW="270" imgH="270" progId="TCLayout.ActiveDocument.1">
+                <p:oleObj spid="_x0000_s66585" name="think-cell Slide" r:id="rId6" imgW="270" imgH="270" progId="TCLayout.ActiveDocument.1">
                   <p:embed/>
                 </p:oleObj>
               </mc:Choice>
@@ -25852,7 +25852,7 @@
           <a:graphicData uri="http://schemas.openxmlformats.org/presentationml/2006/ole">
             <mc:AlternateContent xmlns:mc="http://schemas.openxmlformats.org/markup-compatibility/2006">
               <mc:Choice xmlns:v="urn:schemas-microsoft-com:vml" Requires="v">
-                <p:oleObj spid="_x0000_s59487" name="think-cell Slide" r:id="rId4" imgW="270" imgH="270" progId="TCLayout.ActiveDocument.1">
+                <p:oleObj spid="_x0000_s59489" name="think-cell Slide" r:id="rId4" imgW="270" imgH="270" progId="TCLayout.ActiveDocument.1">
                   <p:embed/>
                 </p:oleObj>
               </mc:Choice>
@@ -26133,7 +26133,7 @@
           <a:graphicData uri="http://schemas.openxmlformats.org/presentationml/2006/ole">
             <mc:AlternateContent xmlns:mc="http://schemas.openxmlformats.org/markup-compatibility/2006">
               <mc:Choice xmlns:v="urn:schemas-microsoft-com:vml" Requires="v">
-                <p:oleObj spid="_x0000_s57446" name="think-cell Slide" r:id="rId5" imgW="270" imgH="270" progId="TCLayout.ActiveDocument.1">
+                <p:oleObj spid="_x0000_s57448" name="think-cell Slide" r:id="rId5" imgW="270" imgH="270" progId="TCLayout.ActiveDocument.1">
                   <p:embed/>
                 </p:oleObj>
               </mc:Choice>
@@ -26615,7 +26615,7 @@
           <a:graphicData uri="http://schemas.openxmlformats.org/presentationml/2006/ole">
             <mc:AlternateContent xmlns:mc="http://schemas.openxmlformats.org/markup-compatibility/2006">
               <mc:Choice xmlns:v="urn:schemas-microsoft-com:vml" Requires="v">
-                <p:oleObj spid="_x0000_s58467" name="think-cell Slide" r:id="rId4" imgW="270" imgH="270" progId="TCLayout.ActiveDocument.1">
+                <p:oleObj spid="_x0000_s58469" name="think-cell Slide" r:id="rId4" imgW="270" imgH="270" progId="TCLayout.ActiveDocument.1">
                   <p:embed/>
                 </p:oleObj>
               </mc:Choice>
@@ -28593,7 +28593,7 @@
           <a:graphicData uri="http://schemas.openxmlformats.org/presentationml/2006/ole">
             <mc:AlternateContent xmlns:mc="http://schemas.openxmlformats.org/markup-compatibility/2006">
               <mc:Choice xmlns:v="urn:schemas-microsoft-com:vml" Requires="v">
-                <p:oleObj spid="_x0000_s23652" name="think-cell Slide" r:id="rId6" imgW="270" imgH="270" progId="TCLayout.ActiveDocument.1">
+                <p:oleObj spid="_x0000_s23654" name="think-cell Slide" r:id="rId6" imgW="270" imgH="270" progId="TCLayout.ActiveDocument.1">
                   <p:embed/>
                 </p:oleObj>
               </mc:Choice>
@@ -30498,7 +30498,7 @@
           <a:graphicData uri="http://schemas.openxmlformats.org/presentationml/2006/ole">
             <mc:AlternateContent xmlns:mc="http://schemas.openxmlformats.org/markup-compatibility/2006">
               <mc:Choice xmlns:v="urn:schemas-microsoft-com:vml" Requires="v">
-                <p:oleObj spid="_x0000_s61474" name="think-cell Slide" r:id="rId4" imgW="270" imgH="270" progId="TCLayout.ActiveDocument.1">
+                <p:oleObj spid="_x0000_s61476" name="think-cell Slide" r:id="rId4" imgW="270" imgH="270" progId="TCLayout.ActiveDocument.1">
                   <p:embed/>
                 </p:oleObj>
               </mc:Choice>
@@ -30968,7 +30968,7 @@
           <a:graphicData uri="http://schemas.openxmlformats.org/presentationml/2006/ole">
             <mc:AlternateContent xmlns:mc="http://schemas.openxmlformats.org/markup-compatibility/2006">
               <mc:Choice xmlns:v="urn:schemas-microsoft-com:vml" Requires="v">
-                <p:oleObj spid="_x0000_s62498" name="think-cell Slide" r:id="rId5" imgW="270" imgH="270" progId="TCLayout.ActiveDocument.1">
+                <p:oleObj spid="_x0000_s62500" name="think-cell Slide" r:id="rId5" imgW="270" imgH="270" progId="TCLayout.ActiveDocument.1">
                   <p:embed/>
                 </p:oleObj>
               </mc:Choice>
@@ -31128,7 +31128,7 @@
 </file>
 
 <file path=ppt/slides/slide7.xml><?xml version="1.0" encoding="utf-8"?>
-<p:sld xmlns:a="http://schemas.openxmlformats.org/drawingml/2006/main" xmlns:r="http://schemas.openxmlformats.org/officeDocument/2006/relationships" xmlns:p="http://schemas.openxmlformats.org/presentationml/2006/main">
+<p:sld xmlns:a="http://schemas.openxmlformats.org/drawingml/2006/main" xmlns:r="http://schemas.openxmlformats.org/officeDocument/2006/relationships" xmlns:p="http://schemas.openxmlformats.org/presentationml/2006/main" show="0">
   <p:cSld>
     <p:spTree>
       <p:nvGrpSpPr>
@@ -31169,7 +31169,7 @@
           <a:graphicData uri="http://schemas.openxmlformats.org/presentationml/2006/ole">
             <mc:AlternateContent xmlns:mc="http://schemas.openxmlformats.org/markup-compatibility/2006">
               <mc:Choice xmlns:v="urn:schemas-microsoft-com:vml" Requires="v">
-                <p:oleObj spid="_x0000_s63522" name="think-cell Slide" r:id="rId7" imgW="270" imgH="270" progId="TCLayout.ActiveDocument.1">
+                <p:oleObj spid="_x0000_s63524" name="think-cell Slide" r:id="rId7" imgW="270" imgH="270" progId="TCLayout.ActiveDocument.1">
                   <p:embed/>
                 </p:oleObj>
               </mc:Choice>
@@ -31624,13 +31624,13 @@
   <p:clrMapOvr>
     <a:masterClrMapping/>
   </p:clrMapOvr>
-  <mc:AlternateContent xmlns:mc="http://schemas.openxmlformats.org/markup-compatibility/2006" xmlns:p14="http://schemas.microsoft.com/office/powerpoint/2010/main">
-    <mc:Choice Requires="p14">
+  <mc:AlternateContent xmlns:mc="http://schemas.openxmlformats.org/markup-compatibility/2006">
+    <mc:Choice xmlns:p14="http://schemas.microsoft.com/office/powerpoint/2010/main" Requires="p14">
       <p:transition spd="med" p14:dur="700">
         <p:fade/>
       </p:transition>
     </mc:Choice>
-    <mc:Fallback xmlns="">
+    <mc:Fallback>
       <p:transition spd="med">
         <p:fade/>
       </p:transition>
@@ -31688,7 +31688,7 @@
           <a:graphicData uri="http://schemas.openxmlformats.org/presentationml/2006/ole">
             <mc:AlternateContent xmlns:mc="http://schemas.openxmlformats.org/markup-compatibility/2006">
               <mc:Choice xmlns:v="urn:schemas-microsoft-com:vml" Requires="v">
-                <p:oleObj spid="_x0000_s29803" name="think-cell Slide" r:id="rId6" imgW="270" imgH="270" progId="TCLayout.ActiveDocument.1">
+                <p:oleObj spid="_x0000_s29805" name="think-cell Slide" r:id="rId6" imgW="270" imgH="270" progId="TCLayout.ActiveDocument.1">
                   <p:embed/>
                 </p:oleObj>
               </mc:Choice>
@@ -35059,6 +35059,26 @@
 </file>
 
 <file path=customXml/item1.xml><?xml version="1.0" encoding="utf-8"?>
+<p:properties xmlns:p="http://schemas.microsoft.com/office/2006/metadata/properties" xmlns:xsi="http://www.w3.org/2001/XMLSchema-instance" xmlns:pc="http://schemas.microsoft.com/office/infopath/2007/PartnerControls">
+  <documentManagement>
+    <TaxKeywordTaxHTField xmlns="230e9df3-be65-4c73-a93b-d1236ebd677e">
+      <Terms xmlns="http://schemas.microsoft.com/office/infopath/2007/PartnerControls"/>
+    </TaxKeywordTaxHTField>
+    <TaxCatchAll xmlns="230e9df3-be65-4c73-a93b-d1236ebd677e"/>
+  </documentManagement>
+</p:properties>
+</file>
+
+<file path=customXml/item2.xml><?xml version="1.0" encoding="utf-8"?>
+<?mso-contentType ?>
+<FormTemplates xmlns="http://schemas.microsoft.com/sharepoint/v3/contenttype/forms">
+  <Display>DocumentLibraryForm</Display>
+  <Edit>DocumentLibraryForm</Edit>
+  <New>DocumentLibraryForm</New>
+</FormTemplates>
+</file>
+
+<file path=customXml/item3.xml><?xml version="1.0" encoding="utf-8"?>
 <ct:contentTypeSchema xmlns:ct="http://schemas.microsoft.com/office/2006/metadata/contentType" xmlns:ma="http://schemas.microsoft.com/office/2006/metadata/properties/metaAttributes" ct:_="" ma:_="" ma:contentTypeName="Document" ma:contentTypeID="0x010100CA05B43BE68FE54B90DD26FDFB72BB05" ma:contentTypeVersion="0" ma:contentTypeDescription="Create a new document." ma:contentTypeScope="" ma:versionID="6df1bece345c1749bd9b91e82fa4a03a">
   <xsd:schema xmlns:xsd="http://www.w3.org/2001/XMLSchema" xmlns:xs="http://www.w3.org/2001/XMLSchema" xmlns:p="http://schemas.microsoft.com/office/2006/metadata/properties" xmlns:ns2="230e9df3-be65-4c73-a93b-d1236ebd677e" targetNamespace="http://schemas.microsoft.com/office/2006/metadata/properties" ma:root="true" ma:fieldsID="e317b0b832c9845d3aae3abd1bb0954e" ns2:_="">
     <xsd:import namespace="230e9df3-be65-4c73-a93b-d1236ebd677e"/>
@@ -35210,27 +35230,31 @@
 </ct:contentTypeSchema>
 </file>
 
-<file path=customXml/item2.xml><?xml version="1.0" encoding="utf-8"?>
-<?mso-contentType ?>
-<FormTemplates xmlns="http://schemas.microsoft.com/sharepoint/v3/contenttype/forms">
-  <Display>DocumentLibraryForm</Display>
-  <Edit>DocumentLibraryForm</Edit>
-  <New>DocumentLibraryForm</New>
-</FormTemplates>
+<file path=customXml/itemProps1.xml><?xml version="1.0" encoding="utf-8"?>
+<ds:datastoreItem xmlns:ds="http://schemas.openxmlformats.org/officeDocument/2006/customXml" ds:itemID="{69B2F97D-0457-4986-9734-D03EB073C5EA}">
+  <ds:schemaRefs>
+    <ds:schemaRef ds:uri="http://purl.org/dc/dcmitype/"/>
+    <ds:schemaRef ds:uri="http://schemas.microsoft.com/office/infopath/2007/PartnerControls"/>
+    <ds:schemaRef ds:uri="230e9df3-be65-4c73-a93b-d1236ebd677e"/>
+    <ds:schemaRef ds:uri="http://purl.org/dc/terms/"/>
+    <ds:schemaRef ds:uri="http://schemas.microsoft.com/office/2006/metadata/properties"/>
+    <ds:schemaRef ds:uri="http://schemas.microsoft.com/office/2006/documentManagement/types"/>
+    <ds:schemaRef ds:uri="http://purl.org/dc/elements/1.1/"/>
+    <ds:schemaRef ds:uri="http://schemas.openxmlformats.org/package/2006/metadata/core-properties"/>
+    <ds:schemaRef ds:uri="http://www.w3.org/XML/1998/namespace"/>
+  </ds:schemaRefs>
+</ds:datastoreItem>
 </file>
 
-<file path=customXml/item3.xml><?xml version="1.0" encoding="utf-8"?>
-<p:properties xmlns:p="http://schemas.microsoft.com/office/2006/metadata/properties" xmlns:xsi="http://www.w3.org/2001/XMLSchema-instance" xmlns:pc="http://schemas.microsoft.com/office/infopath/2007/PartnerControls">
-  <documentManagement>
-    <TaxKeywordTaxHTField xmlns="230e9df3-be65-4c73-a93b-d1236ebd677e">
-      <Terms xmlns="http://schemas.microsoft.com/office/infopath/2007/PartnerControls"/>
-    </TaxKeywordTaxHTField>
-    <TaxCatchAll xmlns="230e9df3-be65-4c73-a93b-d1236ebd677e"/>
-  </documentManagement>
-</p:properties>
+<file path=customXml/itemProps2.xml><?xml version="1.0" encoding="utf-8"?>
+<ds:datastoreItem xmlns:ds="http://schemas.openxmlformats.org/officeDocument/2006/customXml" ds:itemID="{B882D8D6-9D38-4159-A398-AAC3689D3D7C}">
+  <ds:schemaRefs>
+    <ds:schemaRef ds:uri="http://schemas.microsoft.com/sharepoint/v3/contenttype/forms"/>
+  </ds:schemaRefs>
+</ds:datastoreItem>
 </file>
 
-<file path=customXml/itemProps1.xml><?xml version="1.0" encoding="utf-8"?>
+<file path=customXml/itemProps3.xml><?xml version="1.0" encoding="utf-8"?>
 <ds:datastoreItem xmlns:ds="http://schemas.openxmlformats.org/officeDocument/2006/customXml" ds:itemID="{8F590144-748D-417B-8B69-088F107B0F98}">
   <ds:schemaRefs>
     <ds:schemaRef ds:uri="http://schemas.microsoft.com/office/2006/metadata/contentType"/>
@@ -35246,28 +35270,4 @@
     <ds:schemaRef ds:uri="http://schemas.microsoft.com/internal/obd"/>
   </ds:schemaRefs>
 </ds:datastoreItem>
-</file>
-
-<file path=customXml/itemProps2.xml><?xml version="1.0" encoding="utf-8"?>
-<ds:datastoreItem xmlns:ds="http://schemas.openxmlformats.org/officeDocument/2006/customXml" ds:itemID="{B882D8D6-9D38-4159-A398-AAC3689D3D7C}">
-  <ds:schemaRefs>
-    <ds:schemaRef ds:uri="http://schemas.microsoft.com/sharepoint/v3/contenttype/forms"/>
-  </ds:schemaRefs>
-</ds:datastoreItem>
-</file>
-
-<file path=customXml/itemProps3.xml><?xml version="1.0" encoding="utf-8"?>
-<ds:datastoreItem xmlns:ds="http://schemas.openxmlformats.org/officeDocument/2006/customXml" ds:itemID="{69B2F97D-0457-4986-9734-D03EB073C5EA}">
-  <ds:schemaRefs>
-    <ds:schemaRef ds:uri="http://purl.org/dc/dcmitype/"/>
-    <ds:schemaRef ds:uri="http://schemas.microsoft.com/office/infopath/2007/PartnerControls"/>
-    <ds:schemaRef ds:uri="230e9df3-be65-4c73-a93b-d1236ebd677e"/>
-    <ds:schemaRef ds:uri="http://purl.org/dc/terms/"/>
-    <ds:schemaRef ds:uri="http://schemas.microsoft.com/office/2006/metadata/properties"/>
-    <ds:schemaRef ds:uri="http://schemas.microsoft.com/office/2006/documentManagement/types"/>
-    <ds:schemaRef ds:uri="http://purl.org/dc/elements/1.1/"/>
-    <ds:schemaRef ds:uri="http://schemas.openxmlformats.org/package/2006/metadata/core-properties"/>
-    <ds:schemaRef ds:uri="http://www.w3.org/XML/1998/namespace"/>
-  </ds:schemaRefs>
-</ds:datastoreItem>
 </file>
</xml_diff>